<commit_message>
Chapitre 11 et mémoire
</commit_message>
<xml_diff>
--- a/Seconde/AgendaSeconde.pptx
+++ b/Seconde/AgendaSeconde.pptx
@@ -4,11 +4,13 @@
   <p:sldMasterIdLst>
     <p:sldMasterId id="2147483648" r:id="rId1"/>
   </p:sldMasterIdLst>
+  <p:notesMasterIdLst>
+    <p:notesMasterId r:id="rId5"/>
+  </p:notesMasterIdLst>
   <p:sldIdLst>
-    <p:sldId id="256" r:id="rId2"/>
-    <p:sldId id="257" r:id="rId3"/>
-    <p:sldId id="258" r:id="rId4"/>
-    <p:sldId id="259" r:id="rId5"/>
+    <p:sldId id="258" r:id="rId2"/>
+    <p:sldId id="256" r:id="rId3"/>
+    <p:sldId id="257" r:id="rId4"/>
   </p:sldIdLst>
   <p:sldSz cx="12192000" cy="6858000"/>
   <p:notesSz cx="6858000" cy="9144000"/>
@@ -107,7 +109,446 @@
       </a:defRPr>
     </a:lvl9pPr>
   </p:defaultTextStyle>
+  <p:extLst>
+    <p:ext uri="{EFAFB233-063F-42B5-8137-9DF3F51BA10A}">
+      <p15:sldGuideLst xmlns:p15="http://schemas.microsoft.com/office/powerpoint/2012/main"/>
+    </p:ext>
+  </p:extLst>
 </p:presentation>
+</file>
+
+<file path=ppt/notesMasters/notesMaster1.xml><?xml version="1.0" encoding="utf-8"?>
+<p:notesMaster xmlns:a="http://schemas.openxmlformats.org/drawingml/2006/main" xmlns:r="http://schemas.openxmlformats.org/officeDocument/2006/relationships" xmlns:p="http://schemas.openxmlformats.org/presentationml/2006/main">
+  <p:cSld>
+    <p:bg>
+      <p:bgRef idx="1001">
+        <a:schemeClr val="bg1"/>
+      </p:bgRef>
+    </p:bg>
+    <p:spTree>
+      <p:nvGrpSpPr>
+        <p:cNvPr id="1" name=""/>
+        <p:cNvGrpSpPr/>
+        <p:nvPr/>
+      </p:nvGrpSpPr>
+      <p:grpSpPr>
+        <a:xfrm>
+          <a:off x="0" y="0"/>
+          <a:ext cx="0" cy="0"/>
+          <a:chOff x="0" y="0"/>
+          <a:chExt cx="0" cy="0"/>
+        </a:xfrm>
+      </p:grpSpPr>
+      <p:sp>
+        <p:nvSpPr>
+          <p:cNvPr id="2" name="Header Placeholder 1"/>
+          <p:cNvSpPr>
+            <a:spLocks noGrp="1"/>
+          </p:cNvSpPr>
+          <p:nvPr>
+            <p:ph type="hdr" sz="quarter"/>
+          </p:nvPr>
+        </p:nvSpPr>
+        <p:spPr>
+          <a:xfrm>
+            <a:off x="0" y="0"/>
+            <a:ext cx="2971800" cy="458788"/>
+          </a:xfrm>
+          <a:prstGeom prst="rect">
+            <a:avLst/>
+          </a:prstGeom>
+        </p:spPr>
+        <p:txBody>
+          <a:bodyPr vert="horz" lIns="91440" tIns="45720" rIns="91440" bIns="45720" rtlCol="0"/>
+          <a:lstStyle>
+            <a:lvl1pPr algn="l">
+              <a:defRPr sz="1200"/>
+            </a:lvl1pPr>
+          </a:lstStyle>
+          <a:p>
+            <a:endParaRPr lang="fr-FR"/>
+          </a:p>
+        </p:txBody>
+      </p:sp>
+      <p:sp>
+        <p:nvSpPr>
+          <p:cNvPr id="3" name="Date Placeholder 2"/>
+          <p:cNvSpPr>
+            <a:spLocks noGrp="1"/>
+          </p:cNvSpPr>
+          <p:nvPr>
+            <p:ph type="dt" idx="1"/>
+          </p:nvPr>
+        </p:nvSpPr>
+        <p:spPr>
+          <a:xfrm>
+            <a:off x="3884613" y="0"/>
+            <a:ext cx="2971800" cy="458788"/>
+          </a:xfrm>
+          <a:prstGeom prst="rect">
+            <a:avLst/>
+          </a:prstGeom>
+        </p:spPr>
+        <p:txBody>
+          <a:bodyPr vert="horz" lIns="91440" tIns="45720" rIns="91440" bIns="45720" rtlCol="0"/>
+          <a:lstStyle>
+            <a:lvl1pPr algn="r">
+              <a:defRPr sz="1200"/>
+            </a:lvl1pPr>
+          </a:lstStyle>
+          <a:p>
+            <a:fld id="{91AC00F1-EF5A-45FF-8F3C-5CF4AD04CE0F}" type="datetimeFigureOut">
+              <a:rPr lang="fr-FR" smtClean="0"/>
+              <a:t>28/04/2021</a:t>
+            </a:fld>
+            <a:endParaRPr lang="fr-FR"/>
+          </a:p>
+        </p:txBody>
+      </p:sp>
+      <p:sp>
+        <p:nvSpPr>
+          <p:cNvPr id="4" name="Slide Image Placeholder 3"/>
+          <p:cNvSpPr>
+            <a:spLocks noGrp="1" noRot="1" noChangeAspect="1"/>
+          </p:cNvSpPr>
+          <p:nvPr>
+            <p:ph type="sldImg" idx="2"/>
+          </p:nvPr>
+        </p:nvSpPr>
+        <p:spPr>
+          <a:xfrm>
+            <a:off x="685800" y="1143000"/>
+            <a:ext cx="5486400" cy="3086100"/>
+          </a:xfrm>
+          <a:prstGeom prst="rect">
+            <a:avLst/>
+          </a:prstGeom>
+          <a:noFill/>
+          <a:ln w="12700">
+            <a:solidFill>
+              <a:prstClr val="black"/>
+            </a:solidFill>
+          </a:ln>
+        </p:spPr>
+        <p:txBody>
+          <a:bodyPr vert="horz" lIns="91440" tIns="45720" rIns="91440" bIns="45720" rtlCol="0" anchor="ctr"/>
+          <a:lstStyle/>
+          <a:p>
+            <a:endParaRPr lang="fr-FR"/>
+          </a:p>
+        </p:txBody>
+      </p:sp>
+      <p:sp>
+        <p:nvSpPr>
+          <p:cNvPr id="5" name="Notes Placeholder 4"/>
+          <p:cNvSpPr>
+            <a:spLocks noGrp="1"/>
+          </p:cNvSpPr>
+          <p:nvPr>
+            <p:ph type="body" sz="quarter" idx="3"/>
+          </p:nvPr>
+        </p:nvSpPr>
+        <p:spPr>
+          <a:xfrm>
+            <a:off x="685800" y="4400550"/>
+            <a:ext cx="5486400" cy="3600450"/>
+          </a:xfrm>
+          <a:prstGeom prst="rect">
+            <a:avLst/>
+          </a:prstGeom>
+        </p:spPr>
+        <p:txBody>
+          <a:bodyPr vert="horz" lIns="91440" tIns="45720" rIns="91440" bIns="45720" rtlCol="0"/>
+          <a:lstStyle/>
+          <a:p>
+            <a:pPr lvl="0"/>
+            <a:r>
+              <a:rPr lang="en-US"/>
+              <a:t>Click to edit Master text styles</a:t>
+            </a:r>
+          </a:p>
+          <a:p>
+            <a:pPr lvl="1"/>
+            <a:r>
+              <a:rPr lang="en-US"/>
+              <a:t>Second level</a:t>
+            </a:r>
+          </a:p>
+          <a:p>
+            <a:pPr lvl="2"/>
+            <a:r>
+              <a:rPr lang="en-US"/>
+              <a:t>Third level</a:t>
+            </a:r>
+          </a:p>
+          <a:p>
+            <a:pPr lvl="3"/>
+            <a:r>
+              <a:rPr lang="en-US"/>
+              <a:t>Fourth level</a:t>
+            </a:r>
+          </a:p>
+          <a:p>
+            <a:pPr lvl="4"/>
+            <a:r>
+              <a:rPr lang="en-US"/>
+              <a:t>Fifth level</a:t>
+            </a:r>
+            <a:endParaRPr lang="fr-FR"/>
+          </a:p>
+        </p:txBody>
+      </p:sp>
+      <p:sp>
+        <p:nvSpPr>
+          <p:cNvPr id="6" name="Footer Placeholder 5"/>
+          <p:cNvSpPr>
+            <a:spLocks noGrp="1"/>
+          </p:cNvSpPr>
+          <p:nvPr>
+            <p:ph type="ftr" sz="quarter" idx="4"/>
+          </p:nvPr>
+        </p:nvSpPr>
+        <p:spPr>
+          <a:xfrm>
+            <a:off x="0" y="8685213"/>
+            <a:ext cx="2971800" cy="458787"/>
+          </a:xfrm>
+          <a:prstGeom prst="rect">
+            <a:avLst/>
+          </a:prstGeom>
+        </p:spPr>
+        <p:txBody>
+          <a:bodyPr vert="horz" lIns="91440" tIns="45720" rIns="91440" bIns="45720" rtlCol="0" anchor="b"/>
+          <a:lstStyle>
+            <a:lvl1pPr algn="l">
+              <a:defRPr sz="1200"/>
+            </a:lvl1pPr>
+          </a:lstStyle>
+          <a:p>
+            <a:endParaRPr lang="fr-FR"/>
+          </a:p>
+        </p:txBody>
+      </p:sp>
+      <p:sp>
+        <p:nvSpPr>
+          <p:cNvPr id="7" name="Slide Number Placeholder 6"/>
+          <p:cNvSpPr>
+            <a:spLocks noGrp="1"/>
+          </p:cNvSpPr>
+          <p:nvPr>
+            <p:ph type="sldNum" sz="quarter" idx="5"/>
+          </p:nvPr>
+        </p:nvSpPr>
+        <p:spPr>
+          <a:xfrm>
+            <a:off x="3884613" y="8685213"/>
+            <a:ext cx="2971800" cy="458787"/>
+          </a:xfrm>
+          <a:prstGeom prst="rect">
+            <a:avLst/>
+          </a:prstGeom>
+        </p:spPr>
+        <p:txBody>
+          <a:bodyPr vert="horz" lIns="91440" tIns="45720" rIns="91440" bIns="45720" rtlCol="0" anchor="b"/>
+          <a:lstStyle>
+            <a:lvl1pPr algn="r">
+              <a:defRPr sz="1200"/>
+            </a:lvl1pPr>
+          </a:lstStyle>
+          <a:p>
+            <a:fld id="{13D6E7F0-3474-4795-91C8-C66CD400DDC6}" type="slidenum">
+              <a:rPr lang="fr-FR" smtClean="0"/>
+              <a:t>‹#›</a:t>
+            </a:fld>
+            <a:endParaRPr lang="fr-FR"/>
+          </a:p>
+        </p:txBody>
+      </p:sp>
+    </p:spTree>
+    <p:extLst>
+      <p:ext uri="{BB962C8B-B14F-4D97-AF65-F5344CB8AC3E}">
+        <p14:creationId xmlns:p14="http://schemas.microsoft.com/office/powerpoint/2010/main" val="788950975"/>
+      </p:ext>
+    </p:extLst>
+  </p:cSld>
+  <p:clrMap bg1="lt1" tx1="dk1" bg2="lt2" tx2="dk2" accent1="accent1" accent2="accent2" accent3="accent3" accent4="accent4" accent5="accent5" accent6="accent6" hlink="hlink" folHlink="folHlink"/>
+  <p:notesStyle>
+    <a:lvl1pPr marL="0" algn="l" defTabSz="914400" rtl="0" eaLnBrk="1" latinLnBrk="0" hangingPunct="1">
+      <a:defRPr sz="1200" kern="1200">
+        <a:solidFill>
+          <a:schemeClr val="tx1"/>
+        </a:solidFill>
+        <a:latin typeface="+mn-lt"/>
+        <a:ea typeface="+mn-ea"/>
+        <a:cs typeface="+mn-cs"/>
+      </a:defRPr>
+    </a:lvl1pPr>
+    <a:lvl2pPr marL="457200" algn="l" defTabSz="914400" rtl="0" eaLnBrk="1" latinLnBrk="0" hangingPunct="1">
+      <a:defRPr sz="1200" kern="1200">
+        <a:solidFill>
+          <a:schemeClr val="tx1"/>
+        </a:solidFill>
+        <a:latin typeface="+mn-lt"/>
+        <a:ea typeface="+mn-ea"/>
+        <a:cs typeface="+mn-cs"/>
+      </a:defRPr>
+    </a:lvl2pPr>
+    <a:lvl3pPr marL="914400" algn="l" defTabSz="914400" rtl="0" eaLnBrk="1" latinLnBrk="0" hangingPunct="1">
+      <a:defRPr sz="1200" kern="1200">
+        <a:solidFill>
+          <a:schemeClr val="tx1"/>
+        </a:solidFill>
+        <a:latin typeface="+mn-lt"/>
+        <a:ea typeface="+mn-ea"/>
+        <a:cs typeface="+mn-cs"/>
+      </a:defRPr>
+    </a:lvl3pPr>
+    <a:lvl4pPr marL="1371600" algn="l" defTabSz="914400" rtl="0" eaLnBrk="1" latinLnBrk="0" hangingPunct="1">
+      <a:defRPr sz="1200" kern="1200">
+        <a:solidFill>
+          <a:schemeClr val="tx1"/>
+        </a:solidFill>
+        <a:latin typeface="+mn-lt"/>
+        <a:ea typeface="+mn-ea"/>
+        <a:cs typeface="+mn-cs"/>
+      </a:defRPr>
+    </a:lvl4pPr>
+    <a:lvl5pPr marL="1828800" algn="l" defTabSz="914400" rtl="0" eaLnBrk="1" latinLnBrk="0" hangingPunct="1">
+      <a:defRPr sz="1200" kern="1200">
+        <a:solidFill>
+          <a:schemeClr val="tx1"/>
+        </a:solidFill>
+        <a:latin typeface="+mn-lt"/>
+        <a:ea typeface="+mn-ea"/>
+        <a:cs typeface="+mn-cs"/>
+      </a:defRPr>
+    </a:lvl5pPr>
+    <a:lvl6pPr marL="2286000" algn="l" defTabSz="914400" rtl="0" eaLnBrk="1" latinLnBrk="0" hangingPunct="1">
+      <a:defRPr sz="1200" kern="1200">
+        <a:solidFill>
+          <a:schemeClr val="tx1"/>
+        </a:solidFill>
+        <a:latin typeface="+mn-lt"/>
+        <a:ea typeface="+mn-ea"/>
+        <a:cs typeface="+mn-cs"/>
+      </a:defRPr>
+    </a:lvl6pPr>
+    <a:lvl7pPr marL="2743200" algn="l" defTabSz="914400" rtl="0" eaLnBrk="1" latinLnBrk="0" hangingPunct="1">
+      <a:defRPr sz="1200" kern="1200">
+        <a:solidFill>
+          <a:schemeClr val="tx1"/>
+        </a:solidFill>
+        <a:latin typeface="+mn-lt"/>
+        <a:ea typeface="+mn-ea"/>
+        <a:cs typeface="+mn-cs"/>
+      </a:defRPr>
+    </a:lvl7pPr>
+    <a:lvl8pPr marL="3200400" algn="l" defTabSz="914400" rtl="0" eaLnBrk="1" latinLnBrk="0" hangingPunct="1">
+      <a:defRPr sz="1200" kern="1200">
+        <a:solidFill>
+          <a:schemeClr val="tx1"/>
+        </a:solidFill>
+        <a:latin typeface="+mn-lt"/>
+        <a:ea typeface="+mn-ea"/>
+        <a:cs typeface="+mn-cs"/>
+      </a:defRPr>
+    </a:lvl8pPr>
+    <a:lvl9pPr marL="3657600" algn="l" defTabSz="914400" rtl="0" eaLnBrk="1" latinLnBrk="0" hangingPunct="1">
+      <a:defRPr sz="1200" kern="1200">
+        <a:solidFill>
+          <a:schemeClr val="tx1"/>
+        </a:solidFill>
+        <a:latin typeface="+mn-lt"/>
+        <a:ea typeface="+mn-ea"/>
+        <a:cs typeface="+mn-cs"/>
+      </a:defRPr>
+    </a:lvl9pPr>
+  </p:notesStyle>
+</p:notesMaster>
+</file>
+
+<file path=ppt/notesSlides/notesSlide1.xml><?xml version="1.0" encoding="utf-8"?>
+<p:notes xmlns:a="http://schemas.openxmlformats.org/drawingml/2006/main" xmlns:r="http://schemas.openxmlformats.org/officeDocument/2006/relationships" xmlns:p="http://schemas.openxmlformats.org/presentationml/2006/main">
+  <p:cSld>
+    <p:spTree>
+      <p:nvGrpSpPr>
+        <p:cNvPr id="1" name=""/>
+        <p:cNvGrpSpPr/>
+        <p:nvPr/>
+      </p:nvGrpSpPr>
+      <p:grpSpPr>
+        <a:xfrm>
+          <a:off x="0" y="0"/>
+          <a:ext cx="0" cy="0"/>
+          <a:chOff x="0" y="0"/>
+          <a:chExt cx="0" cy="0"/>
+        </a:xfrm>
+      </p:grpSpPr>
+      <p:sp>
+        <p:nvSpPr>
+          <p:cNvPr id="2" name="Slide Image Placeholder 1"/>
+          <p:cNvSpPr>
+            <a:spLocks noGrp="1" noRot="1" noChangeAspect="1"/>
+          </p:cNvSpPr>
+          <p:nvPr>
+            <p:ph type="sldImg"/>
+          </p:nvPr>
+        </p:nvSpPr>
+        <p:spPr/>
+      </p:sp>
+      <p:sp>
+        <p:nvSpPr>
+          <p:cNvPr id="3" name="Notes Placeholder 2"/>
+          <p:cNvSpPr>
+            <a:spLocks noGrp="1"/>
+          </p:cNvSpPr>
+          <p:nvPr>
+            <p:ph type="body" idx="1"/>
+          </p:nvPr>
+        </p:nvSpPr>
+        <p:spPr/>
+        <p:txBody>
+          <a:bodyPr/>
+          <a:lstStyle/>
+          <a:p>
+            <a:endParaRPr lang="fr-FR" dirty="0"/>
+          </a:p>
+        </p:txBody>
+      </p:sp>
+      <p:sp>
+        <p:nvSpPr>
+          <p:cNvPr id="4" name="Slide Number Placeholder 3"/>
+          <p:cNvSpPr>
+            <a:spLocks noGrp="1"/>
+          </p:cNvSpPr>
+          <p:nvPr>
+            <p:ph type="sldNum" sz="quarter" idx="5"/>
+          </p:nvPr>
+        </p:nvSpPr>
+        <p:spPr/>
+        <p:txBody>
+          <a:bodyPr/>
+          <a:lstStyle/>
+          <a:p>
+            <a:fld id="{13D6E7F0-3474-4795-91C8-C66CD400DDC6}" type="slidenum">
+              <a:rPr lang="fr-FR" smtClean="0"/>
+              <a:t>2</a:t>
+            </a:fld>
+            <a:endParaRPr lang="fr-FR"/>
+          </a:p>
+        </p:txBody>
+      </p:sp>
+    </p:spTree>
+    <p:extLst>
+      <p:ext uri="{BB962C8B-B14F-4D97-AF65-F5344CB8AC3E}">
+        <p14:creationId xmlns:p14="http://schemas.microsoft.com/office/powerpoint/2010/main" val="2516664023"/>
+      </p:ext>
+    </p:extLst>
+  </p:cSld>
+  <p:clrMapOvr>
+    <a:masterClrMapping/>
+  </p:clrMapOvr>
+</p:notes>
 </file>
 
 <file path=ppt/slideLayouts/slideLayout1.xml><?xml version="1.0" encoding="utf-8"?>
@@ -259,7 +700,7 @@
           <a:p>
             <a:fld id="{2BC2E294-81F4-43B7-94BC-D7D0AA1FD4DB}" type="datetimeFigureOut">
               <a:rPr lang="fr-FR" smtClean="0"/>
-              <a:t>19/04/2021</a:t>
+              <a:t>28/04/2021</a:t>
             </a:fld>
             <a:endParaRPr lang="fr-FR"/>
           </a:p>
@@ -459,7 +900,7 @@
           <a:p>
             <a:fld id="{2BC2E294-81F4-43B7-94BC-D7D0AA1FD4DB}" type="datetimeFigureOut">
               <a:rPr lang="fr-FR" smtClean="0"/>
-              <a:t>19/04/2021</a:t>
+              <a:t>28/04/2021</a:t>
             </a:fld>
             <a:endParaRPr lang="fr-FR"/>
           </a:p>
@@ -669,7 +1110,7 @@
           <a:p>
             <a:fld id="{2BC2E294-81F4-43B7-94BC-D7D0AA1FD4DB}" type="datetimeFigureOut">
               <a:rPr lang="fr-FR" smtClean="0"/>
-              <a:t>19/04/2021</a:t>
+              <a:t>28/04/2021</a:t>
             </a:fld>
             <a:endParaRPr lang="fr-FR"/>
           </a:p>
@@ -869,7 +1310,7 @@
           <a:p>
             <a:fld id="{2BC2E294-81F4-43B7-94BC-D7D0AA1FD4DB}" type="datetimeFigureOut">
               <a:rPr lang="fr-FR" smtClean="0"/>
-              <a:t>19/04/2021</a:t>
+              <a:t>28/04/2021</a:t>
             </a:fld>
             <a:endParaRPr lang="fr-FR"/>
           </a:p>
@@ -1145,7 +1586,7 @@
           <a:p>
             <a:fld id="{2BC2E294-81F4-43B7-94BC-D7D0AA1FD4DB}" type="datetimeFigureOut">
               <a:rPr lang="fr-FR" smtClean="0"/>
-              <a:t>19/04/2021</a:t>
+              <a:t>28/04/2021</a:t>
             </a:fld>
             <a:endParaRPr lang="fr-FR"/>
           </a:p>
@@ -1413,7 +1854,7 @@
           <a:p>
             <a:fld id="{2BC2E294-81F4-43B7-94BC-D7D0AA1FD4DB}" type="datetimeFigureOut">
               <a:rPr lang="fr-FR" smtClean="0"/>
-              <a:t>19/04/2021</a:t>
+              <a:t>28/04/2021</a:t>
             </a:fld>
             <a:endParaRPr lang="fr-FR"/>
           </a:p>
@@ -1828,7 +2269,7 @@
           <a:p>
             <a:fld id="{2BC2E294-81F4-43B7-94BC-D7D0AA1FD4DB}" type="datetimeFigureOut">
               <a:rPr lang="fr-FR" smtClean="0"/>
-              <a:t>19/04/2021</a:t>
+              <a:t>28/04/2021</a:t>
             </a:fld>
             <a:endParaRPr lang="fr-FR"/>
           </a:p>
@@ -1970,7 +2411,7 @@
           <a:p>
             <a:fld id="{2BC2E294-81F4-43B7-94BC-D7D0AA1FD4DB}" type="datetimeFigureOut">
               <a:rPr lang="fr-FR" smtClean="0"/>
-              <a:t>19/04/2021</a:t>
+              <a:t>28/04/2021</a:t>
             </a:fld>
             <a:endParaRPr lang="fr-FR"/>
           </a:p>
@@ -2083,7 +2524,7 @@
           <a:p>
             <a:fld id="{2BC2E294-81F4-43B7-94BC-D7D0AA1FD4DB}" type="datetimeFigureOut">
               <a:rPr lang="fr-FR" smtClean="0"/>
-              <a:t>19/04/2021</a:t>
+              <a:t>28/04/2021</a:t>
             </a:fld>
             <a:endParaRPr lang="fr-FR"/>
           </a:p>
@@ -2396,7 +2837,7 @@
           <a:p>
             <a:fld id="{2BC2E294-81F4-43B7-94BC-D7D0AA1FD4DB}" type="datetimeFigureOut">
               <a:rPr lang="fr-FR" smtClean="0"/>
-              <a:t>19/04/2021</a:t>
+              <a:t>28/04/2021</a:t>
             </a:fld>
             <a:endParaRPr lang="fr-FR"/>
           </a:p>
@@ -2685,7 +3126,7 @@
           <a:p>
             <a:fld id="{2BC2E294-81F4-43B7-94BC-D7D0AA1FD4DB}" type="datetimeFigureOut">
               <a:rPr lang="fr-FR" smtClean="0"/>
-              <a:t>19/04/2021</a:t>
+              <a:t>28/04/2021</a:t>
             </a:fld>
             <a:endParaRPr lang="fr-FR"/>
           </a:p>
@@ -2928,7 +3369,7 @@
           <a:p>
             <a:fld id="{2BC2E294-81F4-43B7-94BC-D7D0AA1FD4DB}" type="datetimeFigureOut">
               <a:rPr lang="fr-FR" smtClean="0"/>
-              <a:t>19/04/2021</a:t>
+              <a:t>28/04/2021</a:t>
             </a:fld>
             <a:endParaRPr lang="fr-FR"/>
           </a:p>
@@ -3345,22 +3786,141 @@
           <a:chExt cx="0" cy="0"/>
         </a:xfrm>
       </p:grpSpPr>
+      <p:sp>
+        <p:nvSpPr>
+          <p:cNvPr id="2" name="TextBox 1">
+            <a:extLst>
+              <a:ext uri="{FF2B5EF4-FFF2-40B4-BE49-F238E27FC236}">
+                <a16:creationId xmlns:a16="http://schemas.microsoft.com/office/drawing/2014/main" id="{78F3E604-F495-4D71-A26A-027AAD1784A1}"/>
+              </a:ext>
+            </a:extLst>
+          </p:cNvPr>
+          <p:cNvSpPr txBox="1"/>
+          <p:nvPr/>
+        </p:nvSpPr>
+        <p:spPr>
+          <a:xfrm>
+            <a:off x="0" y="328140"/>
+            <a:ext cx="12192000" cy="923330"/>
+          </a:xfrm>
+          <a:prstGeom prst="rect">
+            <a:avLst/>
+          </a:prstGeom>
+          <a:noFill/>
+        </p:spPr>
+        <p:txBody>
+          <a:bodyPr wrap="square" rtlCol="0">
+            <a:spAutoFit/>
+          </a:bodyPr>
+          <a:lstStyle/>
+          <a:p>
+            <a:pPr algn="ctr"/>
+            <a:r>
+              <a:rPr lang="fr-FR" sz="5400" b="1" dirty="0"/>
+              <a:t>Fin d’année en Physique-Chimie et SNT</a:t>
+            </a:r>
+          </a:p>
+        </p:txBody>
+      </p:sp>
+      <p:sp>
+        <p:nvSpPr>
+          <p:cNvPr id="3" name="TextBox 2">
+            <a:extLst>
+              <a:ext uri="{FF2B5EF4-FFF2-40B4-BE49-F238E27FC236}">
+                <a16:creationId xmlns:a16="http://schemas.microsoft.com/office/drawing/2014/main" id="{237A3570-C397-43C5-BA19-B156662DF76B}"/>
+              </a:ext>
+            </a:extLst>
+          </p:cNvPr>
+          <p:cNvSpPr txBox="1"/>
+          <p:nvPr/>
+        </p:nvSpPr>
+        <p:spPr>
+          <a:xfrm>
+            <a:off x="406400" y="3677876"/>
+            <a:ext cx="11785600" cy="553998"/>
+          </a:xfrm>
+          <a:prstGeom prst="rect">
+            <a:avLst/>
+          </a:prstGeom>
+          <a:noFill/>
+        </p:spPr>
+        <p:txBody>
+          <a:bodyPr wrap="square" rtlCol="0">
+            <a:spAutoFit/>
+          </a:bodyPr>
+          <a:lstStyle/>
+          <a:p>
+            <a:r>
+              <a:rPr lang="fr-FR" sz="3000" dirty="0">
+                <a:sym typeface="Wingdings" panose="05000000000000000000" pitchFamily="2" charset="2"/>
+              </a:rPr>
+              <a:t> Tous les polycopiés sont disponibles sur le google drive </a:t>
+            </a:r>
+            <a:r>
+              <a:rPr lang="fr-FR" sz="3000" dirty="0">
+                <a:sym typeface="Wingdings" panose="05000000000000000000" pitchFamily="2" charset="2"/>
+                <a:hlinkClick r:id="rId2"/>
+              </a:rPr>
+              <a:t>acver.fr/2nd3 </a:t>
+            </a:r>
+            <a:endParaRPr lang="fr-FR" sz="3000" dirty="0"/>
+          </a:p>
+        </p:txBody>
+      </p:sp>
+      <p:sp>
+        <p:nvSpPr>
+          <p:cNvPr id="4" name="TextBox 3">
+            <a:extLst>
+              <a:ext uri="{FF2B5EF4-FFF2-40B4-BE49-F238E27FC236}">
+                <a16:creationId xmlns:a16="http://schemas.microsoft.com/office/drawing/2014/main" id="{8605581A-DD04-47CC-935D-2BD27F6CAC7B}"/>
+              </a:ext>
+            </a:extLst>
+          </p:cNvPr>
+          <p:cNvSpPr txBox="1"/>
+          <p:nvPr/>
+        </p:nvSpPr>
+        <p:spPr>
+          <a:xfrm>
+            <a:off x="406400" y="5050830"/>
+            <a:ext cx="2070100" cy="553998"/>
+          </a:xfrm>
+          <a:prstGeom prst="rect">
+            <a:avLst/>
+          </a:prstGeom>
+          <a:noFill/>
+        </p:spPr>
+        <p:txBody>
+          <a:bodyPr wrap="square" rtlCol="0">
+            <a:spAutoFit/>
+          </a:bodyPr>
+          <a:lstStyle/>
+          <a:p>
+            <a:r>
+              <a:rPr lang="fr-FR" sz="3000" dirty="0">
+                <a:sym typeface="Wingdings" panose="05000000000000000000" pitchFamily="2" charset="2"/>
+              </a:rPr>
+              <a:t> Planning</a:t>
+            </a:r>
+            <a:endParaRPr lang="fr-FR" sz="3000" dirty="0"/>
+          </a:p>
+        </p:txBody>
+      </p:sp>
       <p:pic>
         <p:nvPicPr>
-          <p:cNvPr id="1026" name="Picture 2">
-            <a:extLst>
-              <a:ext uri="{FF2B5EF4-FFF2-40B4-BE49-F238E27FC236}">
-                <a16:creationId xmlns:a16="http://schemas.microsoft.com/office/drawing/2014/main" id="{68D1BB38-0B27-4F5A-8028-98A7A71B505D}"/>
+          <p:cNvPr id="1026" name="Picture 2" descr="Back To School School Bell GIF - BackToSchool SchoolBell GIFs">
+            <a:extLst>
+              <a:ext uri="{FF2B5EF4-FFF2-40B4-BE49-F238E27FC236}">
+                <a16:creationId xmlns:a16="http://schemas.microsoft.com/office/drawing/2014/main" id="{EF4CAC20-821B-4F1F-B86D-F0D31B5873E5}"/>
               </a:ext>
             </a:extLst>
           </p:cNvPr>
           <p:cNvPicPr>
-            <a:picLocks noChangeAspect="1" noChangeArrowheads="1"/>
+            <a:picLocks noChangeAspect="1" noChangeArrowheads="1" noCrop="1"/>
           </p:cNvPicPr>
           <p:nvPr/>
         </p:nvPicPr>
         <p:blipFill>
-          <a:blip r:embed="rId2">
+          <a:blip r:embed="rId3">
             <a:extLst>
               <a:ext uri="{28A0092B-C50C-407E-A947-70E740481C1C}">
                 <a14:useLocalDpi xmlns:a14="http://schemas.microsoft.com/office/drawing/2010/main" val="0"/>
@@ -3374,7 +3934,204 @@
         </p:blipFill>
         <p:spPr bwMode="auto">
           <a:xfrm>
-            <a:off x="89043" y="1068539"/>
+            <a:off x="5048250" y="1416923"/>
+            <a:ext cx="2095500" cy="2095500"/>
+          </a:xfrm>
+          <a:prstGeom prst="rect">
+            <a:avLst/>
+          </a:prstGeom>
+          <a:noFill/>
+          <a:extLst>
+            <a:ext uri="{909E8E84-426E-40DD-AFC4-6F175D3DCCD1}">
+              <a14:hiddenFill xmlns:a14="http://schemas.microsoft.com/office/drawing/2010/main">
+                <a:solidFill>
+                  <a:srgbClr val="FFFFFF"/>
+                </a:solidFill>
+              </a14:hiddenFill>
+            </a:ext>
+          </a:extLst>
+        </p:spPr>
+      </p:pic>
+      <p:cxnSp>
+        <p:nvCxnSpPr>
+          <p:cNvPr id="6" name="Straight Arrow Connector 5">
+            <a:extLst>
+              <a:ext uri="{FF2B5EF4-FFF2-40B4-BE49-F238E27FC236}">
+                <a16:creationId xmlns:a16="http://schemas.microsoft.com/office/drawing/2014/main" id="{0943A609-7C58-480E-A048-A00E879ED309}"/>
+              </a:ext>
+            </a:extLst>
+          </p:cNvPr>
+          <p:cNvCxnSpPr/>
+          <p:nvPr/>
+        </p:nvCxnSpPr>
+        <p:spPr>
+          <a:xfrm flipH="1">
+            <a:off x="9677400" y="3086100"/>
+            <a:ext cx="241300" cy="774700"/>
+          </a:xfrm>
+          <a:prstGeom prst="straightConnector1">
+            <a:avLst/>
+          </a:prstGeom>
+          <a:ln>
+            <a:tailEnd type="triangle"/>
+          </a:ln>
+        </p:spPr>
+        <p:style>
+          <a:lnRef idx="1">
+            <a:schemeClr val="accent1"/>
+          </a:lnRef>
+          <a:fillRef idx="0">
+            <a:schemeClr val="accent1"/>
+          </a:fillRef>
+          <a:effectRef idx="0">
+            <a:schemeClr val="accent1"/>
+          </a:effectRef>
+          <a:fontRef idx="minor">
+            <a:schemeClr val="tx1"/>
+          </a:fontRef>
+        </p:style>
+      </p:cxnSp>
+      <p:cxnSp>
+        <p:nvCxnSpPr>
+          <p:cNvPr id="8" name="Straight Arrow Connector 7">
+            <a:extLst>
+              <a:ext uri="{FF2B5EF4-FFF2-40B4-BE49-F238E27FC236}">
+                <a16:creationId xmlns:a16="http://schemas.microsoft.com/office/drawing/2014/main" id="{51343622-93EC-4A1A-91B5-95C445B56ED8}"/>
+              </a:ext>
+            </a:extLst>
+          </p:cNvPr>
+          <p:cNvCxnSpPr>
+            <a:cxnSpLocks/>
+          </p:cNvCxnSpPr>
+          <p:nvPr/>
+        </p:nvCxnSpPr>
+        <p:spPr>
+          <a:xfrm>
+            <a:off x="9918700" y="3086100"/>
+            <a:ext cx="215900" cy="774700"/>
+          </a:xfrm>
+          <a:prstGeom prst="straightConnector1">
+            <a:avLst/>
+          </a:prstGeom>
+          <a:ln>
+            <a:tailEnd type="triangle"/>
+          </a:ln>
+        </p:spPr>
+        <p:style>
+          <a:lnRef idx="1">
+            <a:schemeClr val="accent1"/>
+          </a:lnRef>
+          <a:fillRef idx="0">
+            <a:schemeClr val="accent1"/>
+          </a:fillRef>
+          <a:effectRef idx="0">
+            <a:schemeClr val="accent1"/>
+          </a:effectRef>
+          <a:fontRef idx="minor">
+            <a:schemeClr val="tx1"/>
+          </a:fontRef>
+        </p:style>
+      </p:cxnSp>
+      <p:sp>
+        <p:nvSpPr>
+          <p:cNvPr id="10" name="TextBox 9">
+            <a:extLst>
+              <a:ext uri="{FF2B5EF4-FFF2-40B4-BE49-F238E27FC236}">
+                <a16:creationId xmlns:a16="http://schemas.microsoft.com/office/drawing/2014/main" id="{F2FE5BF8-AFDB-40A1-A912-36F71CFEFA15}"/>
+              </a:ext>
+            </a:extLst>
+          </p:cNvPr>
+          <p:cNvSpPr txBox="1"/>
+          <p:nvPr/>
+        </p:nvSpPr>
+        <p:spPr>
+          <a:xfrm>
+            <a:off x="8839200" y="2781818"/>
+            <a:ext cx="2806700" cy="369332"/>
+          </a:xfrm>
+          <a:prstGeom prst="rect">
+            <a:avLst/>
+          </a:prstGeom>
+          <a:noFill/>
+        </p:spPr>
+        <p:txBody>
+          <a:bodyPr wrap="square" rtlCol="0">
+            <a:spAutoFit/>
+          </a:bodyPr>
+          <a:lstStyle/>
+          <a:p>
+            <a:r>
+              <a:rPr lang="fr-FR" dirty="0"/>
+              <a:t>académie de </a:t>
+            </a:r>
+            <a:r>
+              <a:rPr lang="fr-FR" dirty="0" err="1"/>
+              <a:t>versailles</a:t>
+            </a:r>
+            <a:endParaRPr lang="fr-FR" dirty="0"/>
+          </a:p>
+        </p:txBody>
+      </p:sp>
+    </p:spTree>
+    <p:extLst>
+      <p:ext uri="{BB962C8B-B14F-4D97-AF65-F5344CB8AC3E}">
+        <p14:creationId xmlns:p14="http://schemas.microsoft.com/office/powerpoint/2010/main" val="2029474739"/>
+      </p:ext>
+    </p:extLst>
+  </p:cSld>
+  <p:clrMapOvr>
+    <a:masterClrMapping/>
+  </p:clrMapOvr>
+</p:sld>
+</file>
+
+<file path=ppt/slides/slide2.xml><?xml version="1.0" encoding="utf-8"?>
+<p:sld xmlns:a="http://schemas.openxmlformats.org/drawingml/2006/main" xmlns:r="http://schemas.openxmlformats.org/officeDocument/2006/relationships" xmlns:p="http://schemas.openxmlformats.org/presentationml/2006/main">
+  <p:cSld>
+    <p:spTree>
+      <p:nvGrpSpPr>
+        <p:cNvPr id="1" name=""/>
+        <p:cNvGrpSpPr/>
+        <p:nvPr/>
+      </p:nvGrpSpPr>
+      <p:grpSpPr>
+        <a:xfrm>
+          <a:off x="0" y="0"/>
+          <a:ext cx="0" cy="0"/>
+          <a:chOff x="0" y="0"/>
+          <a:chExt cx="0" cy="0"/>
+        </a:xfrm>
+      </p:grpSpPr>
+      <p:pic>
+        <p:nvPicPr>
+          <p:cNvPr id="1026" name="Picture 2">
+            <a:extLst>
+              <a:ext uri="{FF2B5EF4-FFF2-40B4-BE49-F238E27FC236}">
+                <a16:creationId xmlns:a16="http://schemas.microsoft.com/office/drawing/2014/main" id="{68D1BB38-0B27-4F5A-8028-98A7A71B505D}"/>
+              </a:ext>
+            </a:extLst>
+          </p:cNvPr>
+          <p:cNvPicPr>
+            <a:picLocks noChangeAspect="1" noChangeArrowheads="1"/>
+          </p:cNvPicPr>
+          <p:nvPr/>
+        </p:nvPicPr>
+        <p:blipFill>
+          <a:blip r:embed="rId3">
+            <a:extLst>
+              <a:ext uri="{28A0092B-C50C-407E-A947-70E740481C1C}">
+                <a14:useLocalDpi xmlns:a14="http://schemas.microsoft.com/office/drawing/2010/main" val="0"/>
+              </a:ext>
+            </a:extLst>
+          </a:blip>
+          <a:srcRect/>
+          <a:stretch>
+            <a:fillRect/>
+          </a:stretch>
+        </p:blipFill>
+        <p:spPr bwMode="auto">
+          <a:xfrm>
+            <a:off x="17125" y="1068539"/>
             <a:ext cx="12192000" cy="5889625"/>
           </a:xfrm>
           <a:prstGeom prst="rect">
@@ -3423,7 +4180,15 @@
             <a:pPr algn="ctr"/>
             <a:r>
               <a:rPr lang="fr-FR" sz="5000" b="1" dirty="0"/>
-              <a:t>Agenda</a:t>
+              <a:t>Agenda 2</a:t>
+            </a:r>
+            <a:r>
+              <a:rPr lang="fr-FR" sz="5000" b="1" baseline="30000" dirty="0"/>
+              <a:t>nd</a:t>
+            </a:r>
+            <a:r>
+              <a:rPr lang="fr-FR" sz="5000" b="1" dirty="0"/>
+              <a:t>3</a:t>
             </a:r>
           </a:p>
         </p:txBody>
@@ -3442,7 +4207,7 @@
         </p:nvSpPr>
         <p:spPr>
           <a:xfrm>
-            <a:off x="1850065" y="1657605"/>
+            <a:off x="1778147" y="1657605"/>
             <a:ext cx="8665535" cy="235004"/>
           </a:xfrm>
           <a:prstGeom prst="rect">
@@ -3490,7 +4255,7 @@
         </p:nvSpPr>
         <p:spPr>
           <a:xfrm>
-            <a:off x="1850065" y="2776597"/>
+            <a:off x="1778147" y="2776597"/>
             <a:ext cx="10252891" cy="265827"/>
           </a:xfrm>
           <a:prstGeom prst="rect">
@@ -3547,7 +4312,7 @@
         </p:nvSpPr>
         <p:spPr>
           <a:xfrm>
-            <a:off x="3526464" y="4940226"/>
+            <a:off x="3454546" y="4940226"/>
             <a:ext cx="6989129" cy="217401"/>
           </a:xfrm>
           <a:prstGeom prst="rect">
@@ -3602,8 +4367,8 @@
         </p:nvSpPr>
         <p:spPr>
           <a:xfrm>
-            <a:off x="1787704" y="6027156"/>
-            <a:ext cx="8727886" cy="246583"/>
+            <a:off x="1778136" y="6027156"/>
+            <a:ext cx="8665536" cy="261996"/>
           </a:xfrm>
           <a:prstGeom prst="rect">
             <a:avLst/>
@@ -3650,7 +4415,7 @@
         </p:nvSpPr>
         <p:spPr>
           <a:xfrm>
-            <a:off x="1850063" y="1913875"/>
+            <a:off x="1778145" y="1913875"/>
             <a:ext cx="8639847" cy="316547"/>
           </a:xfrm>
           <a:prstGeom prst="rect">
@@ -3706,7 +4471,7 @@
         </p:nvSpPr>
         <p:spPr>
           <a:xfrm>
-            <a:off x="1850059" y="3048844"/>
+            <a:off x="1778141" y="3048844"/>
             <a:ext cx="8665535" cy="235004"/>
           </a:xfrm>
           <a:prstGeom prst="rect">
@@ -3759,7 +4524,7 @@
         </p:nvSpPr>
         <p:spPr>
           <a:xfrm>
-            <a:off x="1850055" y="4151595"/>
+            <a:off x="1778137" y="4151595"/>
             <a:ext cx="5188697" cy="269762"/>
           </a:xfrm>
           <a:prstGeom prst="rect">
@@ -3812,8 +4577,8 @@
         </p:nvSpPr>
         <p:spPr>
           <a:xfrm>
-            <a:off x="1765444" y="6278420"/>
-            <a:ext cx="8750146" cy="246583"/>
+            <a:off x="1778136" y="6278421"/>
+            <a:ext cx="8665536" cy="200910"/>
           </a:xfrm>
           <a:prstGeom prst="rect">
             <a:avLst/>
@@ -3865,14 +4630,14 @@
         </p:nvSpPr>
         <p:spPr>
           <a:xfrm>
-            <a:off x="7038753" y="3815577"/>
+            <a:off x="6966835" y="3897769"/>
             <a:ext cx="5242289" cy="764837"/>
           </a:xfrm>
           <a:prstGeom prst="rect">
             <a:avLst/>
           </a:prstGeom>
           <a:blipFill>
-            <a:blip r:embed="rId3"/>
+            <a:blip r:embed="rId4"/>
             <a:tile tx="0" ty="0" sx="100000" sy="100000" flip="none" algn="tl"/>
           </a:blipFill>
         </p:spPr>
@@ -3921,14 +4686,14 @@
         </p:nvSpPr>
         <p:spPr>
           <a:xfrm>
-            <a:off x="1765444" y="6046453"/>
+            <a:off x="1734622" y="6036179"/>
             <a:ext cx="1761021" cy="825570"/>
           </a:xfrm>
           <a:prstGeom prst="rect">
             <a:avLst/>
           </a:prstGeom>
           <a:blipFill>
-            <a:blip r:embed="rId3"/>
+            <a:blip r:embed="rId4"/>
             <a:tile tx="0" ty="0" sx="100000" sy="100000" flip="none" algn="tl"/>
           </a:blipFill>
         </p:spPr>
@@ -3978,7 +4743,7 @@
         </p:nvSpPr>
         <p:spPr>
           <a:xfrm rot="670938">
-            <a:off x="1646247" y="4810930"/>
+            <a:off x="1574329" y="4810930"/>
             <a:ext cx="2478549" cy="1121024"/>
           </a:xfrm>
           <a:prstGeom prst="irregularSeal2">
@@ -4034,23 +4799,7 @@
                   <a:schemeClr val="tx1"/>
                 </a:solidFill>
               </a:rPr>
-              <a:t> </a:t>
-            </a:r>
-            <a:r>
-              <a:rPr lang="fr-FR" sz="1200" b="1" dirty="0" err="1">
-                <a:solidFill>
-                  <a:schemeClr val="tx1"/>
-                </a:solidFill>
-              </a:rPr>
-              <a:t>chap</a:t>
-            </a:r>
-            <a:r>
-              <a:rPr lang="fr-FR" sz="1200" b="1" dirty="0">
-                <a:solidFill>
-                  <a:schemeClr val="tx1"/>
-                </a:solidFill>
-              </a:rPr>
-              <a:t> 11 à 13</a:t>
+              <a:t> chap10,11,12</a:t>
             </a:r>
           </a:p>
         </p:txBody>
@@ -4069,7 +4818,7 @@
         </p:nvSpPr>
         <p:spPr>
           <a:xfrm>
-            <a:off x="10515600" y="2775983"/>
+            <a:off x="10443682" y="2775983"/>
             <a:ext cx="1676400" cy="262587"/>
           </a:xfrm>
           <a:custGeom>
@@ -4273,10 +5022,10 @@
       </p:sp>
       <p:sp>
         <p:nvSpPr>
-          <p:cNvPr id="26" name="Rectangle 25">
-            <a:extLst>
-              <a:ext uri="{FF2B5EF4-FFF2-40B4-BE49-F238E27FC236}">
-                <a16:creationId xmlns:a16="http://schemas.microsoft.com/office/drawing/2014/main" id="{27E59D35-A1BC-4F04-9433-4F48193BD32C}"/>
+          <p:cNvPr id="27" name="Rectangle 26">
+            <a:extLst>
+              <a:ext uri="{FF2B5EF4-FFF2-40B4-BE49-F238E27FC236}">
+                <a16:creationId xmlns:a16="http://schemas.microsoft.com/office/drawing/2014/main" id="{33A39101-9A11-4091-8E3A-92460F08C591}"/>
               </a:ext>
             </a:extLst>
           </p:cNvPr>
@@ -4285,7 +5034,333 @@
         </p:nvSpPr>
         <p:spPr>
           <a:xfrm>
-            <a:off x="89043" y="5002287"/>
+            <a:off x="8700497" y="6482469"/>
+            <a:ext cx="1717495" cy="382697"/>
+          </a:xfrm>
+          <a:custGeom>
+            <a:avLst/>
+            <a:gdLst>
+              <a:gd name="connsiteX0" fmla="*/ 0 w 1717495"/>
+              <a:gd name="connsiteY0" fmla="*/ 0 h 382697"/>
+              <a:gd name="connsiteX1" fmla="*/ 606848 w 1717495"/>
+              <a:gd name="connsiteY1" fmla="*/ 0 h 382697"/>
+              <a:gd name="connsiteX2" fmla="*/ 1196522 w 1717495"/>
+              <a:gd name="connsiteY2" fmla="*/ 0 h 382697"/>
+              <a:gd name="connsiteX3" fmla="*/ 1717495 w 1717495"/>
+              <a:gd name="connsiteY3" fmla="*/ 0 h 382697"/>
+              <a:gd name="connsiteX4" fmla="*/ 1717495 w 1717495"/>
+              <a:gd name="connsiteY4" fmla="*/ 382697 h 382697"/>
+              <a:gd name="connsiteX5" fmla="*/ 1179347 w 1717495"/>
+              <a:gd name="connsiteY5" fmla="*/ 382697 h 382697"/>
+              <a:gd name="connsiteX6" fmla="*/ 606848 w 1717495"/>
+              <a:gd name="connsiteY6" fmla="*/ 382697 h 382697"/>
+              <a:gd name="connsiteX7" fmla="*/ 0 w 1717495"/>
+              <a:gd name="connsiteY7" fmla="*/ 382697 h 382697"/>
+              <a:gd name="connsiteX8" fmla="*/ 0 w 1717495"/>
+              <a:gd name="connsiteY8" fmla="*/ 0 h 382697"/>
+            </a:gdLst>
+            <a:ahLst/>
+            <a:cxnLst>
+              <a:cxn ang="0">
+                <a:pos x="connsiteX0" y="connsiteY0"/>
+              </a:cxn>
+              <a:cxn ang="0">
+                <a:pos x="connsiteX1" y="connsiteY1"/>
+              </a:cxn>
+              <a:cxn ang="0">
+                <a:pos x="connsiteX2" y="connsiteY2"/>
+              </a:cxn>
+              <a:cxn ang="0">
+                <a:pos x="connsiteX3" y="connsiteY3"/>
+              </a:cxn>
+              <a:cxn ang="0">
+                <a:pos x="connsiteX4" y="connsiteY4"/>
+              </a:cxn>
+              <a:cxn ang="0">
+                <a:pos x="connsiteX5" y="connsiteY5"/>
+              </a:cxn>
+              <a:cxn ang="0">
+                <a:pos x="connsiteX6" y="connsiteY6"/>
+              </a:cxn>
+              <a:cxn ang="0">
+                <a:pos x="connsiteX7" y="connsiteY7"/>
+              </a:cxn>
+              <a:cxn ang="0">
+                <a:pos x="connsiteX8" y="connsiteY8"/>
+              </a:cxn>
+            </a:cxnLst>
+            <a:rect l="l" t="t" r="r" b="b"/>
+            <a:pathLst>
+              <a:path w="1717495" h="382697" fill="none" extrusionOk="0">
+                <a:moveTo>
+                  <a:pt x="0" y="0"/>
+                </a:moveTo>
+                <a:cubicBezTo>
+                  <a:pt x="233645" y="-52307"/>
+                  <a:pt x="474846" y="40215"/>
+                  <a:pt x="606848" y="0"/>
+                </a:cubicBezTo>
+                <a:cubicBezTo>
+                  <a:pt x="738850" y="-40215"/>
+                  <a:pt x="975361" y="48317"/>
+                  <a:pt x="1196522" y="0"/>
+                </a:cubicBezTo>
+                <a:cubicBezTo>
+                  <a:pt x="1417683" y="-48317"/>
+                  <a:pt x="1531214" y="52773"/>
+                  <a:pt x="1717495" y="0"/>
+                </a:cubicBezTo>
+                <a:cubicBezTo>
+                  <a:pt x="1734958" y="159522"/>
+                  <a:pt x="1673405" y="277958"/>
+                  <a:pt x="1717495" y="382697"/>
+                </a:cubicBezTo>
+                <a:cubicBezTo>
+                  <a:pt x="1482701" y="424616"/>
+                  <a:pt x="1298909" y="337784"/>
+                  <a:pt x="1179347" y="382697"/>
+                </a:cubicBezTo>
+                <a:cubicBezTo>
+                  <a:pt x="1059785" y="427610"/>
+                  <a:pt x="776104" y="337760"/>
+                  <a:pt x="606848" y="382697"/>
+                </a:cubicBezTo>
+                <a:cubicBezTo>
+                  <a:pt x="437592" y="427634"/>
+                  <a:pt x="254720" y="311089"/>
+                  <a:pt x="0" y="382697"/>
+                </a:cubicBezTo>
+                <a:cubicBezTo>
+                  <a:pt x="-18820" y="291079"/>
+                  <a:pt x="33392" y="84725"/>
+                  <a:pt x="0" y="0"/>
+                </a:cubicBezTo>
+                <a:close/>
+              </a:path>
+              <a:path w="1717495" h="382697" stroke="0" extrusionOk="0">
+                <a:moveTo>
+                  <a:pt x="0" y="0"/>
+                </a:moveTo>
+                <a:cubicBezTo>
+                  <a:pt x="208037" y="-44814"/>
+                  <a:pt x="291673" y="56971"/>
+                  <a:pt x="555323" y="0"/>
+                </a:cubicBezTo>
+                <a:cubicBezTo>
+                  <a:pt x="818973" y="-56971"/>
+                  <a:pt x="950910" y="30399"/>
+                  <a:pt x="1076297" y="0"/>
+                </a:cubicBezTo>
+                <a:cubicBezTo>
+                  <a:pt x="1201684" y="-30399"/>
+                  <a:pt x="1500593" y="47842"/>
+                  <a:pt x="1717495" y="0"/>
+                </a:cubicBezTo>
+                <a:cubicBezTo>
+                  <a:pt x="1727890" y="174050"/>
+                  <a:pt x="1681729" y="238189"/>
+                  <a:pt x="1717495" y="382697"/>
+                </a:cubicBezTo>
+                <a:cubicBezTo>
+                  <a:pt x="1526555" y="444364"/>
+                  <a:pt x="1382668" y="378191"/>
+                  <a:pt x="1179347" y="382697"/>
+                </a:cubicBezTo>
+                <a:cubicBezTo>
+                  <a:pt x="976026" y="387203"/>
+                  <a:pt x="722984" y="361115"/>
+                  <a:pt x="572498" y="382697"/>
+                </a:cubicBezTo>
+                <a:cubicBezTo>
+                  <a:pt x="422012" y="404279"/>
+                  <a:pt x="277855" y="349069"/>
+                  <a:pt x="0" y="382697"/>
+                </a:cubicBezTo>
+                <a:cubicBezTo>
+                  <a:pt x="-23831" y="291172"/>
+                  <a:pt x="35705" y="171962"/>
+                  <a:pt x="0" y="0"/>
+                </a:cubicBezTo>
+                <a:close/>
+              </a:path>
+            </a:pathLst>
+          </a:custGeom>
+          <a:solidFill>
+            <a:srgbClr val="FF7C80"/>
+          </a:solidFill>
+          <a:ln>
+            <a:solidFill>
+              <a:schemeClr val="accent1">
+                <a:shade val="50000"/>
+              </a:schemeClr>
+            </a:solidFill>
+            <a:extLst>
+              <a:ext uri="{C807C97D-BFC1-408E-A445-0C87EB9F89A2}">
+                <ask:lineSketchStyleProps xmlns:ask="http://schemas.microsoft.com/office/drawing/2018/sketchyshapes" sd="1219033472">
+                  <a:prstGeom prst="rect">
+                    <a:avLst/>
+                  </a:prstGeom>
+                  <ask:type>
+                    <ask:lineSketchScribble/>
+                  </ask:type>
+                </ask:lineSketchStyleProps>
+              </a:ext>
+            </a:extLst>
+          </a:ln>
+        </p:spPr>
+        <p:style>
+          <a:lnRef idx="2">
+            <a:schemeClr val="accent1">
+              <a:shade val="50000"/>
+            </a:schemeClr>
+          </a:lnRef>
+          <a:fillRef idx="1">
+            <a:schemeClr val="accent1"/>
+          </a:fillRef>
+          <a:effectRef idx="0">
+            <a:schemeClr val="accent1"/>
+          </a:effectRef>
+          <a:fontRef idx="minor">
+            <a:schemeClr val="lt1"/>
+          </a:fontRef>
+        </p:style>
+        <p:txBody>
+          <a:bodyPr rtlCol="0" anchor="ctr"/>
+          <a:lstStyle/>
+          <a:p>
+            <a:pPr algn="ctr"/>
+            <a:r>
+              <a:rPr lang="fr-FR" sz="1400" b="1" dirty="0">
+                <a:solidFill>
+                  <a:schemeClr val="tx1"/>
+                </a:solidFill>
+              </a:rPr>
+              <a:t>CONSEIL DE CLASSE</a:t>
+            </a:r>
+          </a:p>
+        </p:txBody>
+      </p:sp>
+      <p:sp>
+        <p:nvSpPr>
+          <p:cNvPr id="15" name="Rectangle 14">
+            <a:extLst>
+              <a:ext uri="{FF2B5EF4-FFF2-40B4-BE49-F238E27FC236}">
+                <a16:creationId xmlns:a16="http://schemas.microsoft.com/office/drawing/2014/main" id="{A7CAADA6-2609-4F13-94C6-0963B3760F2C}"/>
+              </a:ext>
+            </a:extLst>
+          </p:cNvPr>
+          <p:cNvSpPr/>
+          <p:nvPr/>
+        </p:nvSpPr>
+        <p:spPr>
+          <a:xfrm>
+            <a:off x="3454542" y="5162280"/>
+            <a:ext cx="6989130" cy="248320"/>
+          </a:xfrm>
+          <a:prstGeom prst="rect">
+            <a:avLst/>
+          </a:prstGeom>
+          <a:solidFill>
+            <a:schemeClr val="bg1">
+              <a:lumMod val="65000"/>
+            </a:schemeClr>
+          </a:solidFill>
+          <a:ln>
+            <a:noFill/>
+          </a:ln>
+        </p:spPr>
+        <p:style>
+          <a:lnRef idx="2">
+            <a:schemeClr val="accent1">
+              <a:shade val="50000"/>
+            </a:schemeClr>
+          </a:lnRef>
+          <a:fillRef idx="1">
+            <a:schemeClr val="accent1"/>
+          </a:fillRef>
+          <a:effectRef idx="0">
+            <a:schemeClr val="accent1"/>
+          </a:effectRef>
+          <a:fontRef idx="minor">
+            <a:schemeClr val="lt1"/>
+          </a:fontRef>
+        </p:style>
+        <p:txBody>
+          <a:bodyPr rtlCol="0" anchor="ctr"/>
+          <a:lstStyle/>
+          <a:p>
+            <a:r>
+              <a:rPr lang="fr-FR" dirty="0"/>
+              <a:t>SNT : Internet</a:t>
+            </a:r>
+          </a:p>
+        </p:txBody>
+      </p:sp>
+      <p:sp>
+        <p:nvSpPr>
+          <p:cNvPr id="28" name="Rectangle 27">
+            <a:extLst>
+              <a:ext uri="{FF2B5EF4-FFF2-40B4-BE49-F238E27FC236}">
+                <a16:creationId xmlns:a16="http://schemas.microsoft.com/office/drawing/2014/main" id="{C9987E5D-B3D8-48A7-99E8-8589903E8FE1}"/>
+              </a:ext>
+            </a:extLst>
+          </p:cNvPr>
+          <p:cNvSpPr/>
+          <p:nvPr/>
+        </p:nvSpPr>
+        <p:spPr>
+          <a:xfrm>
+            <a:off x="1778136" y="3883427"/>
+            <a:ext cx="5188697" cy="263487"/>
+          </a:xfrm>
+          <a:prstGeom prst="rect">
+            <a:avLst/>
+          </a:prstGeom>
+          <a:solidFill>
+            <a:schemeClr val="accent6">
+              <a:lumMod val="50000"/>
+            </a:schemeClr>
+          </a:solidFill>
+        </p:spPr>
+        <p:style>
+          <a:lnRef idx="2">
+            <a:schemeClr val="accent2">
+              <a:shade val="50000"/>
+            </a:schemeClr>
+          </a:lnRef>
+          <a:fillRef idx="1">
+            <a:schemeClr val="accent2"/>
+          </a:fillRef>
+          <a:effectRef idx="0">
+            <a:schemeClr val="accent2"/>
+          </a:effectRef>
+          <a:fontRef idx="minor">
+            <a:schemeClr val="lt1"/>
+          </a:fontRef>
+        </p:style>
+        <p:txBody>
+          <a:bodyPr rtlCol="0" anchor="ctr"/>
+          <a:lstStyle/>
+          <a:p>
+            <a:endParaRPr lang="fr-FR" dirty="0"/>
+          </a:p>
+        </p:txBody>
+      </p:sp>
+      <p:sp>
+        <p:nvSpPr>
+          <p:cNvPr id="26" name="Rectangle 25">
+            <a:extLst>
+              <a:ext uri="{FF2B5EF4-FFF2-40B4-BE49-F238E27FC236}">
+                <a16:creationId xmlns:a16="http://schemas.microsoft.com/office/drawing/2014/main" id="{27E59D35-A1BC-4F04-9433-4F48193BD32C}"/>
+              </a:ext>
+            </a:extLst>
+          </p:cNvPr>
+          <p:cNvSpPr/>
+          <p:nvPr/>
+        </p:nvSpPr>
+        <p:spPr>
+          <a:xfrm>
+            <a:off x="17125" y="4985319"/>
             <a:ext cx="1765452" cy="607514"/>
           </a:xfrm>
           <a:custGeom>
@@ -4518,327 +5593,38 @@
       </p:sp>
       <p:sp>
         <p:nvSpPr>
-          <p:cNvPr id="27" name="Rectangle 26">
-            <a:extLst>
-              <a:ext uri="{FF2B5EF4-FFF2-40B4-BE49-F238E27FC236}">
-                <a16:creationId xmlns:a16="http://schemas.microsoft.com/office/drawing/2014/main" id="{33A39101-9A11-4091-8E3A-92460F08C591}"/>
-              </a:ext>
-            </a:extLst>
-          </p:cNvPr>
-          <p:cNvSpPr/>
+          <p:cNvPr id="2" name="TextBox 1">
+            <a:extLst>
+              <a:ext uri="{FF2B5EF4-FFF2-40B4-BE49-F238E27FC236}">
+                <a16:creationId xmlns:a16="http://schemas.microsoft.com/office/drawing/2014/main" id="{C305F696-D345-41CE-81CD-C95A8C667F01}"/>
+              </a:ext>
+            </a:extLst>
+          </p:cNvPr>
+          <p:cNvSpPr txBox="1"/>
           <p:nvPr/>
         </p:nvSpPr>
         <p:spPr>
           <a:xfrm>
-            <a:off x="8772415" y="6482469"/>
-            <a:ext cx="1717495" cy="382697"/>
-          </a:xfrm>
-          <a:custGeom>
-            <a:avLst/>
-            <a:gdLst>
-              <a:gd name="connsiteX0" fmla="*/ 0 w 1717495"/>
-              <a:gd name="connsiteY0" fmla="*/ 0 h 382697"/>
-              <a:gd name="connsiteX1" fmla="*/ 606848 w 1717495"/>
-              <a:gd name="connsiteY1" fmla="*/ 0 h 382697"/>
-              <a:gd name="connsiteX2" fmla="*/ 1196522 w 1717495"/>
-              <a:gd name="connsiteY2" fmla="*/ 0 h 382697"/>
-              <a:gd name="connsiteX3" fmla="*/ 1717495 w 1717495"/>
-              <a:gd name="connsiteY3" fmla="*/ 0 h 382697"/>
-              <a:gd name="connsiteX4" fmla="*/ 1717495 w 1717495"/>
-              <a:gd name="connsiteY4" fmla="*/ 382697 h 382697"/>
-              <a:gd name="connsiteX5" fmla="*/ 1179347 w 1717495"/>
-              <a:gd name="connsiteY5" fmla="*/ 382697 h 382697"/>
-              <a:gd name="connsiteX6" fmla="*/ 606848 w 1717495"/>
-              <a:gd name="connsiteY6" fmla="*/ 382697 h 382697"/>
-              <a:gd name="connsiteX7" fmla="*/ 0 w 1717495"/>
-              <a:gd name="connsiteY7" fmla="*/ 382697 h 382697"/>
-              <a:gd name="connsiteX8" fmla="*/ 0 w 1717495"/>
-              <a:gd name="connsiteY8" fmla="*/ 0 h 382697"/>
-            </a:gdLst>
-            <a:ahLst/>
-            <a:cxnLst>
-              <a:cxn ang="0">
-                <a:pos x="connsiteX0" y="connsiteY0"/>
-              </a:cxn>
-              <a:cxn ang="0">
-                <a:pos x="connsiteX1" y="connsiteY1"/>
-              </a:cxn>
-              <a:cxn ang="0">
-                <a:pos x="connsiteX2" y="connsiteY2"/>
-              </a:cxn>
-              <a:cxn ang="0">
-                <a:pos x="connsiteX3" y="connsiteY3"/>
-              </a:cxn>
-              <a:cxn ang="0">
-                <a:pos x="connsiteX4" y="connsiteY4"/>
-              </a:cxn>
-              <a:cxn ang="0">
-                <a:pos x="connsiteX5" y="connsiteY5"/>
-              </a:cxn>
-              <a:cxn ang="0">
-                <a:pos x="connsiteX6" y="connsiteY6"/>
-              </a:cxn>
-              <a:cxn ang="0">
-                <a:pos x="connsiteX7" y="connsiteY7"/>
-              </a:cxn>
-              <a:cxn ang="0">
-                <a:pos x="connsiteX8" y="connsiteY8"/>
-              </a:cxn>
-            </a:cxnLst>
-            <a:rect l="l" t="t" r="r" b="b"/>
-            <a:pathLst>
-              <a:path w="1717495" h="382697" fill="none" extrusionOk="0">
-                <a:moveTo>
-                  <a:pt x="0" y="0"/>
-                </a:moveTo>
-                <a:cubicBezTo>
-                  <a:pt x="233645" y="-52307"/>
-                  <a:pt x="474846" y="40215"/>
-                  <a:pt x="606848" y="0"/>
-                </a:cubicBezTo>
-                <a:cubicBezTo>
-                  <a:pt x="738850" y="-40215"/>
-                  <a:pt x="975361" y="48317"/>
-                  <a:pt x="1196522" y="0"/>
-                </a:cubicBezTo>
-                <a:cubicBezTo>
-                  <a:pt x="1417683" y="-48317"/>
-                  <a:pt x="1531214" y="52773"/>
-                  <a:pt x="1717495" y="0"/>
-                </a:cubicBezTo>
-                <a:cubicBezTo>
-                  <a:pt x="1734958" y="159522"/>
-                  <a:pt x="1673405" y="277958"/>
-                  <a:pt x="1717495" y="382697"/>
-                </a:cubicBezTo>
-                <a:cubicBezTo>
-                  <a:pt x="1482701" y="424616"/>
-                  <a:pt x="1298909" y="337784"/>
-                  <a:pt x="1179347" y="382697"/>
-                </a:cubicBezTo>
-                <a:cubicBezTo>
-                  <a:pt x="1059785" y="427610"/>
-                  <a:pt x="776104" y="337760"/>
-                  <a:pt x="606848" y="382697"/>
-                </a:cubicBezTo>
-                <a:cubicBezTo>
-                  <a:pt x="437592" y="427634"/>
-                  <a:pt x="254720" y="311089"/>
-                  <a:pt x="0" y="382697"/>
-                </a:cubicBezTo>
-                <a:cubicBezTo>
-                  <a:pt x="-18820" y="291079"/>
-                  <a:pt x="33392" y="84725"/>
-                  <a:pt x="0" y="0"/>
-                </a:cubicBezTo>
-                <a:close/>
-              </a:path>
-              <a:path w="1717495" h="382697" stroke="0" extrusionOk="0">
-                <a:moveTo>
-                  <a:pt x="0" y="0"/>
-                </a:moveTo>
-                <a:cubicBezTo>
-                  <a:pt x="208037" y="-44814"/>
-                  <a:pt x="291673" y="56971"/>
-                  <a:pt x="555323" y="0"/>
-                </a:cubicBezTo>
-                <a:cubicBezTo>
-                  <a:pt x="818973" y="-56971"/>
-                  <a:pt x="950910" y="30399"/>
-                  <a:pt x="1076297" y="0"/>
-                </a:cubicBezTo>
-                <a:cubicBezTo>
-                  <a:pt x="1201684" y="-30399"/>
-                  <a:pt x="1500593" y="47842"/>
-                  <a:pt x="1717495" y="0"/>
-                </a:cubicBezTo>
-                <a:cubicBezTo>
-                  <a:pt x="1727890" y="174050"/>
-                  <a:pt x="1681729" y="238189"/>
-                  <a:pt x="1717495" y="382697"/>
-                </a:cubicBezTo>
-                <a:cubicBezTo>
-                  <a:pt x="1526555" y="444364"/>
-                  <a:pt x="1382668" y="378191"/>
-                  <a:pt x="1179347" y="382697"/>
-                </a:cubicBezTo>
-                <a:cubicBezTo>
-                  <a:pt x="976026" y="387203"/>
-                  <a:pt x="722984" y="361115"/>
-                  <a:pt x="572498" y="382697"/>
-                </a:cubicBezTo>
-                <a:cubicBezTo>
-                  <a:pt x="422012" y="404279"/>
-                  <a:pt x="277855" y="349069"/>
-                  <a:pt x="0" y="382697"/>
-                </a:cubicBezTo>
-                <a:cubicBezTo>
-                  <a:pt x="-23831" y="291172"/>
-                  <a:pt x="35705" y="171962"/>
-                  <a:pt x="0" y="0"/>
-                </a:cubicBezTo>
-                <a:close/>
-              </a:path>
-            </a:pathLst>
-          </a:custGeom>
-          <a:solidFill>
-            <a:srgbClr val="FF7C80"/>
-          </a:solidFill>
-          <a:ln>
-            <a:solidFill>
-              <a:schemeClr val="accent1">
-                <a:shade val="50000"/>
-              </a:schemeClr>
-            </a:solidFill>
-            <a:extLst>
-              <a:ext uri="{C807C97D-BFC1-408E-A445-0C87EB9F89A2}">
-                <ask:lineSketchStyleProps xmlns:ask="http://schemas.microsoft.com/office/drawing/2018/sketchyshapes" sd="1219033472">
-                  <a:prstGeom prst="rect">
-                    <a:avLst/>
-                  </a:prstGeom>
-                  <ask:type>
-                    <ask:lineSketchScribble/>
-                  </ask:type>
-                </ask:lineSketchStyleProps>
-              </a:ext>
-            </a:extLst>
-          </a:ln>
-        </p:spPr>
-        <p:style>
-          <a:lnRef idx="2">
-            <a:schemeClr val="accent1">
-              <a:shade val="50000"/>
-            </a:schemeClr>
-          </a:lnRef>
-          <a:fillRef idx="1">
-            <a:schemeClr val="accent1"/>
-          </a:fillRef>
-          <a:effectRef idx="0">
-            <a:schemeClr val="accent1"/>
-          </a:effectRef>
-          <a:fontRef idx="minor">
-            <a:schemeClr val="lt1"/>
-          </a:fontRef>
-        </p:style>
-        <p:txBody>
-          <a:bodyPr rtlCol="0" anchor="ctr"/>
-          <a:lstStyle/>
-          <a:p>
-            <a:pPr algn="ctr"/>
-            <a:r>
-              <a:rPr lang="fr-FR" sz="1400" b="1" dirty="0">
-                <a:solidFill>
-                  <a:schemeClr val="tx1"/>
-                </a:solidFill>
-              </a:rPr>
-              <a:t>CONSEIL DE CLASSE</a:t>
-            </a:r>
-          </a:p>
-        </p:txBody>
-      </p:sp>
-      <p:sp>
-        <p:nvSpPr>
-          <p:cNvPr id="15" name="Rectangle 14">
-            <a:extLst>
-              <a:ext uri="{FF2B5EF4-FFF2-40B4-BE49-F238E27FC236}">
-                <a16:creationId xmlns:a16="http://schemas.microsoft.com/office/drawing/2014/main" id="{A7CAADA6-2609-4F13-94C6-0963B3760F2C}"/>
-              </a:ext>
-            </a:extLst>
-          </p:cNvPr>
-          <p:cNvSpPr/>
-          <p:nvPr/>
-        </p:nvSpPr>
-        <p:spPr>
-          <a:xfrm>
-            <a:off x="3526460" y="5162280"/>
-            <a:ext cx="6989130" cy="248320"/>
+            <a:off x="17125" y="2480314"/>
+            <a:ext cx="749300" cy="369332"/>
           </a:xfrm>
           <a:prstGeom prst="rect">
             <a:avLst/>
           </a:prstGeom>
           <a:solidFill>
-            <a:schemeClr val="bg1">
-              <a:lumMod val="65000"/>
-            </a:schemeClr>
-          </a:solidFill>
-          <a:ln>
-            <a:noFill/>
-          </a:ln>
-        </p:spPr>
-        <p:style>
-          <a:lnRef idx="2">
-            <a:schemeClr val="accent1">
-              <a:shade val="50000"/>
-            </a:schemeClr>
-          </a:lnRef>
-          <a:fillRef idx="1">
-            <a:schemeClr val="accent1"/>
-          </a:fillRef>
-          <a:effectRef idx="0">
-            <a:schemeClr val="accent1"/>
-          </a:effectRef>
-          <a:fontRef idx="minor">
-            <a:schemeClr val="lt1"/>
-          </a:fontRef>
-        </p:style>
-        <p:txBody>
-          <a:bodyPr rtlCol="0" anchor="ctr"/>
-          <a:lstStyle/>
-          <a:p>
-            <a:r>
-              <a:rPr lang="fr-FR" dirty="0"/>
-              <a:t>SNT : Internet</a:t>
-            </a:r>
-          </a:p>
-        </p:txBody>
-      </p:sp>
-      <p:sp>
-        <p:nvSpPr>
-          <p:cNvPr id="28" name="Rectangle 27">
-            <a:extLst>
-              <a:ext uri="{FF2B5EF4-FFF2-40B4-BE49-F238E27FC236}">
-                <a16:creationId xmlns:a16="http://schemas.microsoft.com/office/drawing/2014/main" id="{C9987E5D-B3D8-48A7-99E8-8589903E8FE1}"/>
-              </a:ext>
-            </a:extLst>
-          </p:cNvPr>
-          <p:cNvSpPr/>
-          <p:nvPr/>
-        </p:nvSpPr>
-        <p:spPr>
-          <a:xfrm>
-            <a:off x="1850054" y="3883427"/>
-            <a:ext cx="5188697" cy="263487"/>
-          </a:xfrm>
-          <a:prstGeom prst="rect">
-            <a:avLst/>
-          </a:prstGeom>
-          <a:solidFill>
-            <a:schemeClr val="accent6">
-              <a:lumMod val="50000"/>
-            </a:schemeClr>
+            <a:srgbClr val="FFC000"/>
           </a:solidFill>
         </p:spPr>
-        <p:style>
-          <a:lnRef idx="2">
-            <a:schemeClr val="accent2">
-              <a:shade val="50000"/>
-            </a:schemeClr>
-          </a:lnRef>
-          <a:fillRef idx="1">
-            <a:schemeClr val="accent2"/>
-          </a:fillRef>
-          <a:effectRef idx="0">
-            <a:schemeClr val="accent2"/>
-          </a:effectRef>
-          <a:fontRef idx="minor">
-            <a:schemeClr val="lt1"/>
-          </a:fontRef>
-        </p:style>
-        <p:txBody>
-          <a:bodyPr rtlCol="0" anchor="ctr"/>
-          <a:lstStyle/>
-          <a:p>
-            <a:endParaRPr lang="fr-FR" dirty="0"/>
+        <p:txBody>
+          <a:bodyPr wrap="square" rtlCol="0">
+            <a:spAutoFit/>
+          </a:bodyPr>
+          <a:lstStyle/>
+          <a:p>
+            <a:r>
+              <a:rPr lang="fr-FR" dirty="0"/>
+              <a:t>Mai</a:t>
+            </a:r>
           </a:p>
         </p:txBody>
       </p:sp>
@@ -4855,7 +5641,7 @@
 </p:sld>
 </file>
 
-<file path=ppt/slides/slide2.xml><?xml version="1.0" encoding="utf-8"?>
+<file path=ppt/slides/slide3.xml><?xml version="1.0" encoding="utf-8"?>
 <p:sld xmlns:a="http://schemas.openxmlformats.org/drawingml/2006/main" xmlns:r="http://schemas.openxmlformats.org/officeDocument/2006/relationships" xmlns:p="http://schemas.openxmlformats.org/presentationml/2006/main">
   <p:cSld>
     <p:spTree>
@@ -4886,7 +5672,7 @@
           </p:cNvPicPr>
           <p:nvPr/>
         </p:nvPicPr>
-        <p:blipFill>
+        <p:blipFill rotWithShape="1">
           <a:blip r:embed="rId2">
             <a:extLst>
               <a:ext uri="{28A0092B-C50C-407E-A947-70E740481C1C}">
@@ -4894,15 +5680,13 @@
               </a:ext>
             </a:extLst>
           </a:blip>
-          <a:srcRect/>
-          <a:stretch>
-            <a:fillRect/>
-          </a:stretch>
+          <a:srcRect b="33273"/>
+          <a:stretch/>
         </p:blipFill>
         <p:spPr bwMode="auto">
           <a:xfrm>
             <a:off x="0" y="1271587"/>
-            <a:ext cx="12192000" cy="4314825"/>
+            <a:ext cx="12192000" cy="2879173"/>
           </a:xfrm>
           <a:prstGeom prst="rect">
             <a:avLst/>
@@ -5201,614 +5985,47 @@
           </a:p>
         </p:txBody>
       </p:sp>
+      <p:sp>
+        <p:nvSpPr>
+          <p:cNvPr id="8" name="TextBox 7">
+            <a:extLst>
+              <a:ext uri="{FF2B5EF4-FFF2-40B4-BE49-F238E27FC236}">
+                <a16:creationId xmlns:a16="http://schemas.microsoft.com/office/drawing/2014/main" id="{E330F82B-EDAF-4667-B40C-A204A7905388}"/>
+              </a:ext>
+            </a:extLst>
+          </p:cNvPr>
+          <p:cNvSpPr txBox="1"/>
+          <p:nvPr/>
+        </p:nvSpPr>
+        <p:spPr>
+          <a:xfrm>
+            <a:off x="3490797" y="947273"/>
+            <a:ext cx="749300" cy="369332"/>
+          </a:xfrm>
+          <a:prstGeom prst="rect">
+            <a:avLst/>
+          </a:prstGeom>
+          <a:solidFill>
+            <a:srgbClr val="FFC000"/>
+          </a:solidFill>
+        </p:spPr>
+        <p:txBody>
+          <a:bodyPr wrap="square" rtlCol="0">
+            <a:spAutoFit/>
+          </a:bodyPr>
+          <a:lstStyle/>
+          <a:p>
+            <a:r>
+              <a:rPr lang="fr-FR" dirty="0"/>
+              <a:t>Juin</a:t>
+            </a:r>
+          </a:p>
+        </p:txBody>
+      </p:sp>
     </p:spTree>
     <p:extLst>
       <p:ext uri="{BB962C8B-B14F-4D97-AF65-F5344CB8AC3E}">
         <p14:creationId xmlns:p14="http://schemas.microsoft.com/office/powerpoint/2010/main" val="3460337043"/>
-      </p:ext>
-    </p:extLst>
-  </p:cSld>
-  <p:clrMapOvr>
-    <a:masterClrMapping/>
-  </p:clrMapOvr>
-</p:sld>
-</file>
-
-<file path=ppt/slides/slide3.xml><?xml version="1.0" encoding="utf-8"?>
-<p:sld xmlns:a="http://schemas.openxmlformats.org/drawingml/2006/main" xmlns:r="http://schemas.openxmlformats.org/officeDocument/2006/relationships" xmlns:p="http://schemas.openxmlformats.org/presentationml/2006/main">
-  <p:cSld>
-    <p:spTree>
-      <p:nvGrpSpPr>
-        <p:cNvPr id="1" name=""/>
-        <p:cNvGrpSpPr/>
-        <p:nvPr/>
-      </p:nvGrpSpPr>
-      <p:grpSpPr>
-        <a:xfrm>
-          <a:off x="0" y="0"/>
-          <a:ext cx="0" cy="0"/>
-          <a:chOff x="0" y="0"/>
-          <a:chExt cx="0" cy="0"/>
-        </a:xfrm>
-      </p:grpSpPr>
-      <p:pic>
-        <p:nvPicPr>
-          <p:cNvPr id="1026" name="Picture 2">
-            <a:extLst>
-              <a:ext uri="{FF2B5EF4-FFF2-40B4-BE49-F238E27FC236}">
-                <a16:creationId xmlns:a16="http://schemas.microsoft.com/office/drawing/2014/main" id="{68D1BB38-0B27-4F5A-8028-98A7A71B505D}"/>
-              </a:ext>
-            </a:extLst>
-          </p:cNvPr>
-          <p:cNvPicPr>
-            <a:picLocks noChangeAspect="1" noChangeArrowheads="1"/>
-          </p:cNvPicPr>
-          <p:nvPr/>
-        </p:nvPicPr>
-        <p:blipFill>
-          <a:blip r:embed="rId2">
-            <a:extLst>
-              <a:ext uri="{28A0092B-C50C-407E-A947-70E740481C1C}">
-                <a14:useLocalDpi xmlns:a14="http://schemas.microsoft.com/office/drawing/2010/main" val="0"/>
-              </a:ext>
-            </a:extLst>
-          </a:blip>
-          <a:srcRect/>
-          <a:stretch>
-            <a:fillRect/>
-          </a:stretch>
-        </p:blipFill>
-        <p:spPr bwMode="auto">
-          <a:xfrm>
-            <a:off x="89042" y="1068539"/>
-            <a:ext cx="12192000" cy="5889625"/>
-          </a:xfrm>
-          <a:prstGeom prst="rect">
-            <a:avLst/>
-          </a:prstGeom>
-          <a:noFill/>
-          <a:extLst>
-            <a:ext uri="{909E8E84-426E-40DD-AFC4-6F175D3DCCD1}">
-              <a14:hiddenFill xmlns:a14="http://schemas.microsoft.com/office/drawing/2010/main">
-                <a:solidFill>
-                  <a:srgbClr val="FFFFFF"/>
-                </a:solidFill>
-              </a14:hiddenFill>
-            </a:ext>
-          </a:extLst>
-        </p:spPr>
-      </p:pic>
-      <p:sp>
-        <p:nvSpPr>
-          <p:cNvPr id="4" name="TextBox 3">
-            <a:extLst>
-              <a:ext uri="{FF2B5EF4-FFF2-40B4-BE49-F238E27FC236}">
-                <a16:creationId xmlns:a16="http://schemas.microsoft.com/office/drawing/2014/main" id="{11829ED3-183C-42DB-AB18-C876FFCC1AAC}"/>
-              </a:ext>
-            </a:extLst>
-          </p:cNvPr>
-          <p:cNvSpPr txBox="1"/>
-          <p:nvPr/>
-        </p:nvSpPr>
-        <p:spPr>
-          <a:xfrm>
-            <a:off x="71919" y="0"/>
-            <a:ext cx="12120081" cy="861774"/>
-          </a:xfrm>
-          <a:prstGeom prst="rect">
-            <a:avLst/>
-          </a:prstGeom>
-          <a:noFill/>
-        </p:spPr>
-        <p:txBody>
-          <a:bodyPr wrap="square" rtlCol="0">
-            <a:spAutoFit/>
-          </a:bodyPr>
-          <a:lstStyle/>
-          <a:p>
-            <a:pPr algn="ctr"/>
-            <a:r>
-              <a:rPr lang="fr-FR" sz="5000" b="1" dirty="0"/>
-              <a:t>Agenda</a:t>
-            </a:r>
-          </a:p>
-        </p:txBody>
-      </p:sp>
-      <p:sp>
-        <p:nvSpPr>
-          <p:cNvPr id="5" name="Rectangle 4">
-            <a:extLst>
-              <a:ext uri="{FF2B5EF4-FFF2-40B4-BE49-F238E27FC236}">
-                <a16:creationId xmlns:a16="http://schemas.microsoft.com/office/drawing/2014/main" id="{E2E2E219-DC96-4808-8BDE-558C482AE07C}"/>
-              </a:ext>
-            </a:extLst>
-          </p:cNvPr>
-          <p:cNvSpPr/>
-          <p:nvPr/>
-        </p:nvSpPr>
-        <p:spPr>
-          <a:xfrm>
-            <a:off x="7038751" y="1655087"/>
-            <a:ext cx="1733665" cy="539644"/>
-          </a:xfrm>
-          <a:prstGeom prst="rect">
-            <a:avLst/>
-          </a:prstGeom>
-        </p:spPr>
-        <p:style>
-          <a:lnRef idx="2">
-            <a:schemeClr val="accent1">
-              <a:shade val="50000"/>
-            </a:schemeClr>
-          </a:lnRef>
-          <a:fillRef idx="1">
-            <a:schemeClr val="accent1"/>
-          </a:fillRef>
-          <a:effectRef idx="0">
-            <a:schemeClr val="accent1"/>
-          </a:effectRef>
-          <a:fontRef idx="minor">
-            <a:schemeClr val="lt1"/>
-          </a:fontRef>
-        </p:style>
-        <p:txBody>
-          <a:bodyPr rtlCol="0" anchor="ctr"/>
-          <a:lstStyle/>
-          <a:p>
-            <a:r>
-              <a:rPr lang="fr-FR" sz="1600" dirty="0"/>
-              <a:t>IA- Caractéristiques</a:t>
-            </a:r>
-          </a:p>
-        </p:txBody>
-      </p:sp>
-      <p:sp>
-        <p:nvSpPr>
-          <p:cNvPr id="6" name="Rectangle 5">
-            <a:extLst>
-              <a:ext uri="{FF2B5EF4-FFF2-40B4-BE49-F238E27FC236}">
-                <a16:creationId xmlns:a16="http://schemas.microsoft.com/office/drawing/2014/main" id="{BB5E132B-8F6A-4F1E-84B2-40D1457EF526}"/>
-              </a:ext>
-            </a:extLst>
-          </p:cNvPr>
-          <p:cNvSpPr/>
-          <p:nvPr/>
-        </p:nvSpPr>
-        <p:spPr>
-          <a:xfrm>
-            <a:off x="7054921" y="3883526"/>
-            <a:ext cx="5242289" cy="731725"/>
-          </a:xfrm>
-          <a:prstGeom prst="rect">
-            <a:avLst/>
-          </a:prstGeom>
-          <a:blipFill>
-            <a:blip r:embed="rId3"/>
-            <a:tile tx="0" ty="0" sx="100000" sy="100000" flip="none" algn="tl"/>
-          </a:blipFill>
-        </p:spPr>
-        <p:style>
-          <a:lnRef idx="2">
-            <a:schemeClr val="accent1">
-              <a:shade val="50000"/>
-            </a:schemeClr>
-          </a:lnRef>
-          <a:fillRef idx="1">
-            <a:schemeClr val="accent1"/>
-          </a:fillRef>
-          <a:effectRef idx="0">
-            <a:schemeClr val="accent1"/>
-          </a:effectRef>
-          <a:fontRef idx="minor">
-            <a:schemeClr val="lt1"/>
-          </a:fontRef>
-        </p:style>
-        <p:txBody>
-          <a:bodyPr rtlCol="0" anchor="ctr"/>
-          <a:lstStyle/>
-          <a:p>
-            <a:r>
-              <a:rPr lang="fr-FR" sz="4000" b="1" i="1" dirty="0">
-                <a:solidFill>
-                  <a:schemeClr val="tx1"/>
-                </a:solidFill>
-              </a:rPr>
-              <a:t>Férié ! </a:t>
-            </a:r>
-          </a:p>
-        </p:txBody>
-      </p:sp>
-      <p:sp>
-        <p:nvSpPr>
-          <p:cNvPr id="21" name="Rectangle 20">
-            <a:extLst>
-              <a:ext uri="{FF2B5EF4-FFF2-40B4-BE49-F238E27FC236}">
-                <a16:creationId xmlns:a16="http://schemas.microsoft.com/office/drawing/2014/main" id="{088F52F7-B126-48D5-88C1-1D0EC473FFDF}"/>
-              </a:ext>
-            </a:extLst>
-          </p:cNvPr>
-          <p:cNvSpPr/>
-          <p:nvPr/>
-        </p:nvSpPr>
-        <p:spPr>
-          <a:xfrm>
-            <a:off x="7054921" y="2751888"/>
-            <a:ext cx="1717495" cy="539644"/>
-          </a:xfrm>
-          <a:prstGeom prst="rect">
-            <a:avLst/>
-          </a:prstGeom>
-        </p:spPr>
-        <p:style>
-          <a:lnRef idx="2">
-            <a:schemeClr val="accent1">
-              <a:shade val="50000"/>
-            </a:schemeClr>
-          </a:lnRef>
-          <a:fillRef idx="1">
-            <a:schemeClr val="accent1"/>
-          </a:fillRef>
-          <a:effectRef idx="0">
-            <a:schemeClr val="accent1"/>
-          </a:effectRef>
-          <a:fontRef idx="minor">
-            <a:schemeClr val="lt1"/>
-          </a:fontRef>
-        </p:style>
-        <p:txBody>
-          <a:bodyPr rtlCol="0" anchor="ctr"/>
-          <a:lstStyle/>
-          <a:p>
-            <a:r>
-              <a:rPr lang="fr-FR" dirty="0"/>
-              <a:t>IA- Classifieur</a:t>
-            </a:r>
-          </a:p>
-        </p:txBody>
-      </p:sp>
-      <p:sp>
-        <p:nvSpPr>
-          <p:cNvPr id="22" name="Explosion: 14 Points 21">
-            <a:extLst>
-              <a:ext uri="{FF2B5EF4-FFF2-40B4-BE49-F238E27FC236}">
-                <a16:creationId xmlns:a16="http://schemas.microsoft.com/office/drawing/2014/main" id="{ED6D773D-2FB9-49DD-8123-A13B90FB16AF}"/>
-              </a:ext>
-            </a:extLst>
-          </p:cNvPr>
-          <p:cNvSpPr/>
-          <p:nvPr/>
-        </p:nvSpPr>
-        <p:spPr>
-          <a:xfrm rot="205451">
-            <a:off x="6595899" y="3669879"/>
-            <a:ext cx="2433468" cy="1159016"/>
-          </a:xfrm>
-          <a:prstGeom prst="irregularSeal2">
-            <a:avLst/>
-          </a:prstGeom>
-          <a:solidFill>
-            <a:schemeClr val="accent4">
-              <a:lumMod val="40000"/>
-              <a:lumOff val="60000"/>
-            </a:schemeClr>
-          </a:solidFill>
-        </p:spPr>
-        <p:style>
-          <a:lnRef idx="2">
-            <a:schemeClr val="accent1">
-              <a:shade val="50000"/>
-            </a:schemeClr>
-          </a:lnRef>
-          <a:fillRef idx="1">
-            <a:schemeClr val="accent1"/>
-          </a:fillRef>
-          <a:effectRef idx="0">
-            <a:schemeClr val="accent1"/>
-          </a:effectRef>
-          <a:fontRef idx="minor">
-            <a:schemeClr val="lt1"/>
-          </a:fontRef>
-        </p:style>
-        <p:txBody>
-          <a:bodyPr rtlCol="0" anchor="ctr"/>
-          <a:lstStyle/>
-          <a:p>
-            <a:pPr algn="ctr"/>
-            <a:r>
-              <a:rPr lang="fr-FR" b="1" dirty="0">
-                <a:solidFill>
-                  <a:schemeClr val="tx1"/>
-                </a:solidFill>
-              </a:rPr>
-              <a:t>DM</a:t>
-            </a:r>
-          </a:p>
-          <a:p>
-            <a:pPr algn="ctr"/>
-            <a:r>
-              <a:rPr lang="fr-FR" b="1" dirty="0">
-                <a:solidFill>
-                  <a:schemeClr val="tx1"/>
-                </a:solidFill>
-              </a:rPr>
-              <a:t>QCM (noté)</a:t>
-            </a:r>
-          </a:p>
-        </p:txBody>
-      </p:sp>
-      <p:sp>
-        <p:nvSpPr>
-          <p:cNvPr id="23" name="Rectangle 22">
-            <a:extLst>
-              <a:ext uri="{FF2B5EF4-FFF2-40B4-BE49-F238E27FC236}">
-                <a16:creationId xmlns:a16="http://schemas.microsoft.com/office/drawing/2014/main" id="{EB46D007-EF7C-4374-B190-470D9B752C5D}"/>
-              </a:ext>
-            </a:extLst>
-          </p:cNvPr>
-          <p:cNvSpPr/>
-          <p:nvPr/>
-        </p:nvSpPr>
-        <p:spPr>
-          <a:xfrm>
-            <a:off x="7038751" y="5093464"/>
-            <a:ext cx="1717495" cy="516225"/>
-          </a:xfrm>
-          <a:prstGeom prst="rect">
-            <a:avLst/>
-          </a:prstGeom>
-        </p:spPr>
-        <p:style>
-          <a:lnRef idx="2">
-            <a:schemeClr val="accent1">
-              <a:shade val="50000"/>
-            </a:schemeClr>
-          </a:lnRef>
-          <a:fillRef idx="1">
-            <a:schemeClr val="accent1"/>
-          </a:fillRef>
-          <a:effectRef idx="0">
-            <a:schemeClr val="accent1"/>
-          </a:effectRef>
-          <a:fontRef idx="minor">
-            <a:schemeClr val="lt1"/>
-          </a:fontRef>
-        </p:style>
-        <p:txBody>
-          <a:bodyPr rtlCol="0" anchor="ctr"/>
-          <a:lstStyle/>
-          <a:p>
-            <a:r>
-              <a:rPr lang="fr-FR" dirty="0"/>
-              <a:t>IA-Inférence Bayésienne</a:t>
-            </a:r>
-          </a:p>
-        </p:txBody>
-      </p:sp>
-      <p:sp>
-        <p:nvSpPr>
-          <p:cNvPr id="24" name="Rectangle 23">
-            <a:extLst>
-              <a:ext uri="{FF2B5EF4-FFF2-40B4-BE49-F238E27FC236}">
-                <a16:creationId xmlns:a16="http://schemas.microsoft.com/office/drawing/2014/main" id="{630C9D79-A731-44B4-ACCB-8EC57BC9C907}"/>
-              </a:ext>
-            </a:extLst>
-          </p:cNvPr>
-          <p:cNvSpPr/>
-          <p:nvPr/>
-        </p:nvSpPr>
-        <p:spPr>
-          <a:xfrm>
-            <a:off x="7038750" y="6114998"/>
-            <a:ext cx="1717495" cy="516225"/>
-          </a:xfrm>
-          <a:prstGeom prst="rect">
-            <a:avLst/>
-          </a:prstGeom>
-        </p:spPr>
-        <p:style>
-          <a:lnRef idx="2">
-            <a:schemeClr val="accent1">
-              <a:shade val="50000"/>
-            </a:schemeClr>
-          </a:lnRef>
-          <a:fillRef idx="1">
-            <a:schemeClr val="accent1"/>
-          </a:fillRef>
-          <a:effectRef idx="0">
-            <a:schemeClr val="accent1"/>
-          </a:effectRef>
-          <a:fontRef idx="minor">
-            <a:schemeClr val="lt1"/>
-          </a:fontRef>
-        </p:style>
-        <p:txBody>
-          <a:bodyPr rtlCol="0" anchor="ctr"/>
-          <a:lstStyle/>
-          <a:p>
-            <a:r>
-              <a:rPr lang="fr-FR" dirty="0"/>
-              <a:t>Modèle démographique</a:t>
-            </a:r>
-          </a:p>
-        </p:txBody>
-      </p:sp>
-    </p:spTree>
-    <p:extLst>
-      <p:ext uri="{BB962C8B-B14F-4D97-AF65-F5344CB8AC3E}">
-        <p14:creationId xmlns:p14="http://schemas.microsoft.com/office/powerpoint/2010/main" val="1869994198"/>
-      </p:ext>
-    </p:extLst>
-  </p:cSld>
-  <p:clrMapOvr>
-    <a:masterClrMapping/>
-  </p:clrMapOvr>
-</p:sld>
-</file>
-
-<file path=ppt/slides/slide4.xml><?xml version="1.0" encoding="utf-8"?>
-<p:sld xmlns:a="http://schemas.openxmlformats.org/drawingml/2006/main" xmlns:r="http://schemas.openxmlformats.org/officeDocument/2006/relationships" xmlns:p="http://schemas.openxmlformats.org/presentationml/2006/main">
-  <p:cSld>
-    <p:spTree>
-      <p:nvGrpSpPr>
-        <p:cNvPr id="1" name=""/>
-        <p:cNvGrpSpPr/>
-        <p:nvPr/>
-      </p:nvGrpSpPr>
-      <p:grpSpPr>
-        <a:xfrm>
-          <a:off x="0" y="0"/>
-          <a:ext cx="0" cy="0"/>
-          <a:chOff x="0" y="0"/>
-          <a:chExt cx="0" cy="0"/>
-        </a:xfrm>
-      </p:grpSpPr>
-      <p:pic>
-        <p:nvPicPr>
-          <p:cNvPr id="2050" name="Picture 2">
-            <a:extLst>
-              <a:ext uri="{FF2B5EF4-FFF2-40B4-BE49-F238E27FC236}">
-                <a16:creationId xmlns:a16="http://schemas.microsoft.com/office/drawing/2014/main" id="{677D2E30-4122-42E0-961F-D9C7EE897505}"/>
-              </a:ext>
-            </a:extLst>
-          </p:cNvPr>
-          <p:cNvPicPr>
-            <a:picLocks noChangeAspect="1" noChangeArrowheads="1"/>
-          </p:cNvPicPr>
-          <p:nvPr/>
-        </p:nvPicPr>
-        <p:blipFill>
-          <a:blip r:embed="rId2">
-            <a:extLst>
-              <a:ext uri="{28A0092B-C50C-407E-A947-70E740481C1C}">
-                <a14:useLocalDpi xmlns:a14="http://schemas.microsoft.com/office/drawing/2010/main" val="0"/>
-              </a:ext>
-            </a:extLst>
-          </a:blip>
-          <a:srcRect/>
-          <a:stretch>
-            <a:fillRect/>
-          </a:stretch>
-        </p:blipFill>
-        <p:spPr bwMode="auto">
-          <a:xfrm>
-            <a:off x="0" y="1271587"/>
-            <a:ext cx="12192000" cy="4314825"/>
-          </a:xfrm>
-          <a:prstGeom prst="rect">
-            <a:avLst/>
-          </a:prstGeom>
-          <a:noFill/>
-          <a:extLst>
-            <a:ext uri="{909E8E84-426E-40DD-AFC4-6F175D3DCCD1}">
-              <a14:hiddenFill xmlns:a14="http://schemas.microsoft.com/office/drawing/2010/main">
-                <a:solidFill>
-                  <a:srgbClr val="FFFFFF"/>
-                </a:solidFill>
-              </a14:hiddenFill>
-            </a:ext>
-          </a:extLst>
-        </p:spPr>
-      </p:pic>
-      <p:sp>
-        <p:nvSpPr>
-          <p:cNvPr id="8" name="Rectangle 7">
-            <a:extLst>
-              <a:ext uri="{FF2B5EF4-FFF2-40B4-BE49-F238E27FC236}">
-                <a16:creationId xmlns:a16="http://schemas.microsoft.com/office/drawing/2014/main" id="{21AC7BBA-8079-4717-AC9C-155CF4FD30AE}"/>
-              </a:ext>
-            </a:extLst>
-          </p:cNvPr>
-          <p:cNvSpPr/>
-          <p:nvPr/>
-        </p:nvSpPr>
-        <p:spPr>
-          <a:xfrm>
-            <a:off x="6946283" y="2369091"/>
-            <a:ext cx="1717495" cy="516225"/>
-          </a:xfrm>
-          <a:prstGeom prst="rect">
-            <a:avLst/>
-          </a:prstGeom>
-        </p:spPr>
-        <p:style>
-          <a:lnRef idx="2">
-            <a:schemeClr val="accent1">
-              <a:shade val="50000"/>
-            </a:schemeClr>
-          </a:lnRef>
-          <a:fillRef idx="1">
-            <a:schemeClr val="accent1"/>
-          </a:fillRef>
-          <a:effectRef idx="0">
-            <a:schemeClr val="accent1"/>
-          </a:effectRef>
-          <a:fontRef idx="minor">
-            <a:schemeClr val="lt1"/>
-          </a:fontRef>
-        </p:style>
-        <p:txBody>
-          <a:bodyPr rtlCol="0" anchor="ctr"/>
-          <a:lstStyle/>
-          <a:p>
-            <a:r>
-              <a:rPr lang="fr-FR" dirty="0"/>
-              <a:t>Modèle démographique</a:t>
-            </a:r>
-          </a:p>
-        </p:txBody>
-      </p:sp>
-      <p:sp>
-        <p:nvSpPr>
-          <p:cNvPr id="9" name="Rectangle 8">
-            <a:extLst>
-              <a:ext uri="{FF2B5EF4-FFF2-40B4-BE49-F238E27FC236}">
-                <a16:creationId xmlns:a16="http://schemas.microsoft.com/office/drawing/2014/main" id="{07D95BC5-6DE7-46A5-A7C6-49D0584393FC}"/>
-              </a:ext>
-            </a:extLst>
-          </p:cNvPr>
-          <p:cNvSpPr/>
-          <p:nvPr/>
-        </p:nvSpPr>
-        <p:spPr>
-          <a:xfrm>
-            <a:off x="6946282" y="3714572"/>
-            <a:ext cx="1717495" cy="516225"/>
-          </a:xfrm>
-          <a:prstGeom prst="rect">
-            <a:avLst/>
-          </a:prstGeom>
-        </p:spPr>
-        <p:style>
-          <a:lnRef idx="2">
-            <a:schemeClr val="accent1">
-              <a:shade val="50000"/>
-            </a:schemeClr>
-          </a:lnRef>
-          <a:fillRef idx="1">
-            <a:schemeClr val="accent1"/>
-          </a:fillRef>
-          <a:effectRef idx="0">
-            <a:schemeClr val="accent1"/>
-          </a:effectRef>
-          <a:fontRef idx="minor">
-            <a:schemeClr val="lt1"/>
-          </a:fontRef>
-        </p:style>
-        <p:txBody>
-          <a:bodyPr rtlCol="0" anchor="ctr"/>
-          <a:lstStyle/>
-          <a:p>
-            <a:r>
-              <a:rPr lang="fr-FR" dirty="0"/>
-              <a:t>Modèle démographique</a:t>
-            </a:r>
-          </a:p>
-        </p:txBody>
-      </p:sp>
-    </p:spTree>
-    <p:extLst>
-      <p:ext uri="{BB962C8B-B14F-4D97-AF65-F5344CB8AC3E}">
-        <p14:creationId xmlns:p14="http://schemas.microsoft.com/office/powerpoint/2010/main" val="4186287017"/>
       </p:ext>
     </p:extLst>
   </p:cSld>
@@ -6111,4 +6328,299 @@
     </a:ext>
   </a:extLst>
 </a:theme>
+</file>
+
+<file path=ppt/theme/theme2.xml><?xml version="1.0" encoding="utf-8"?>
+<a:theme xmlns:a="http://schemas.openxmlformats.org/drawingml/2006/main" name="Office Theme">
+  <a:themeElements>
+    <a:clrScheme name="Office">
+      <a:dk1>
+        <a:sysClr val="windowText" lastClr="000000"/>
+      </a:dk1>
+      <a:lt1>
+        <a:sysClr val="window" lastClr="FFFFFF"/>
+      </a:lt1>
+      <a:dk2>
+        <a:srgbClr val="44546A"/>
+      </a:dk2>
+      <a:lt2>
+        <a:srgbClr val="E7E6E6"/>
+      </a:lt2>
+      <a:accent1>
+        <a:srgbClr val="4472C4"/>
+      </a:accent1>
+      <a:accent2>
+        <a:srgbClr val="ED7D31"/>
+      </a:accent2>
+      <a:accent3>
+        <a:srgbClr val="A5A5A5"/>
+      </a:accent3>
+      <a:accent4>
+        <a:srgbClr val="FFC000"/>
+      </a:accent4>
+      <a:accent5>
+        <a:srgbClr val="5B9BD5"/>
+      </a:accent5>
+      <a:accent6>
+        <a:srgbClr val="70AD47"/>
+      </a:accent6>
+      <a:hlink>
+        <a:srgbClr val="0563C1"/>
+      </a:hlink>
+      <a:folHlink>
+        <a:srgbClr val="954F72"/>
+      </a:folHlink>
+    </a:clrScheme>
+    <a:fontScheme name="Office">
+      <a:majorFont>
+        <a:latin typeface="Calibri Light" panose="020F0302020204030204"/>
+        <a:ea typeface=""/>
+        <a:cs typeface=""/>
+        <a:font script="Jpan" typeface="游ゴシック Light"/>
+        <a:font script="Hang" typeface="맑은 고딕"/>
+        <a:font script="Hans" typeface="等线 Light"/>
+        <a:font script="Hant" typeface="新細明體"/>
+        <a:font script="Arab" typeface="Times New Roman"/>
+        <a:font script="Hebr" typeface="Times New Roman"/>
+        <a:font script="Thai" typeface="Angsana New"/>
+        <a:font script="Ethi" typeface="Nyala"/>
+        <a:font script="Beng" typeface="Vrinda"/>
+        <a:font script="Gujr" typeface="Shruti"/>
+        <a:font script="Khmr" typeface="MoolBoran"/>
+        <a:font script="Knda" typeface="Tunga"/>
+        <a:font script="Guru" typeface="Raavi"/>
+        <a:font script="Cans" typeface="Euphemia"/>
+        <a:font script="Cher" typeface="Plantagenet Cherokee"/>
+        <a:font script="Yiii" typeface="Microsoft Yi Baiti"/>
+        <a:font script="Tibt" typeface="Microsoft Himalaya"/>
+        <a:font script="Thaa" typeface="MV Boli"/>
+        <a:font script="Deva" typeface="Mangal"/>
+        <a:font script="Telu" typeface="Gautami"/>
+        <a:font script="Taml" typeface="Latha"/>
+        <a:font script="Syrc" typeface="Estrangelo Edessa"/>
+        <a:font script="Orya" typeface="Kalinga"/>
+        <a:font script="Mlym" typeface="Kartika"/>
+        <a:font script="Laoo" typeface="DokChampa"/>
+        <a:font script="Sinh" typeface="Iskoola Pota"/>
+        <a:font script="Mong" typeface="Mongolian Baiti"/>
+        <a:font script="Viet" typeface="Times New Roman"/>
+        <a:font script="Uigh" typeface="Microsoft Uighur"/>
+        <a:font script="Geor" typeface="Sylfaen"/>
+        <a:font script="Armn" typeface="Arial"/>
+        <a:font script="Bugi" typeface="Leelawadee UI"/>
+        <a:font script="Bopo" typeface="Microsoft JhengHei"/>
+        <a:font script="Java" typeface="Javanese Text"/>
+        <a:font script="Lisu" typeface="Segoe UI"/>
+        <a:font script="Mymr" typeface="Myanmar Text"/>
+        <a:font script="Nkoo" typeface="Ebrima"/>
+        <a:font script="Olck" typeface="Nirmala UI"/>
+        <a:font script="Osma" typeface="Ebrima"/>
+        <a:font script="Phag" typeface="Phagspa"/>
+        <a:font script="Syrn" typeface="Estrangelo Edessa"/>
+        <a:font script="Syrj" typeface="Estrangelo Edessa"/>
+        <a:font script="Syre" typeface="Estrangelo Edessa"/>
+        <a:font script="Sora" typeface="Nirmala UI"/>
+        <a:font script="Tale" typeface="Microsoft Tai Le"/>
+        <a:font script="Talu" typeface="Microsoft New Tai Lue"/>
+        <a:font script="Tfng" typeface="Ebrima"/>
+      </a:majorFont>
+      <a:minorFont>
+        <a:latin typeface="Calibri" panose="020F0502020204030204"/>
+        <a:ea typeface=""/>
+        <a:cs typeface=""/>
+        <a:font script="Jpan" typeface="游ゴシック"/>
+        <a:font script="Hang" typeface="맑은 고딕"/>
+        <a:font script="Hans" typeface="等线"/>
+        <a:font script="Hant" typeface="新細明體"/>
+        <a:font script="Arab" typeface="Arial"/>
+        <a:font script="Hebr" typeface="Arial"/>
+        <a:font script="Thai" typeface="Cordia New"/>
+        <a:font script="Ethi" typeface="Nyala"/>
+        <a:font script="Beng" typeface="Vrinda"/>
+        <a:font script="Gujr" typeface="Shruti"/>
+        <a:font script="Khmr" typeface="DaunPenh"/>
+        <a:font script="Knda" typeface="Tunga"/>
+        <a:font script="Guru" typeface="Raavi"/>
+        <a:font script="Cans" typeface="Euphemia"/>
+        <a:font script="Cher" typeface="Plantagenet Cherokee"/>
+        <a:font script="Yiii" typeface="Microsoft Yi Baiti"/>
+        <a:font script="Tibt" typeface="Microsoft Himalaya"/>
+        <a:font script="Thaa" typeface="MV Boli"/>
+        <a:font script="Deva" typeface="Mangal"/>
+        <a:font script="Telu" typeface="Gautami"/>
+        <a:font script="Taml" typeface="Latha"/>
+        <a:font script="Syrc" typeface="Estrangelo Edessa"/>
+        <a:font script="Orya" typeface="Kalinga"/>
+        <a:font script="Mlym" typeface="Kartika"/>
+        <a:font script="Laoo" typeface="DokChampa"/>
+        <a:font script="Sinh" typeface="Iskoola Pota"/>
+        <a:font script="Mong" typeface="Mongolian Baiti"/>
+        <a:font script="Viet" typeface="Arial"/>
+        <a:font script="Uigh" typeface="Microsoft Uighur"/>
+        <a:font script="Geor" typeface="Sylfaen"/>
+        <a:font script="Armn" typeface="Arial"/>
+        <a:font script="Bugi" typeface="Leelawadee UI"/>
+        <a:font script="Bopo" typeface="Microsoft JhengHei"/>
+        <a:font script="Java" typeface="Javanese Text"/>
+        <a:font script="Lisu" typeface="Segoe UI"/>
+        <a:font script="Mymr" typeface="Myanmar Text"/>
+        <a:font script="Nkoo" typeface="Ebrima"/>
+        <a:font script="Olck" typeface="Nirmala UI"/>
+        <a:font script="Osma" typeface="Ebrima"/>
+        <a:font script="Phag" typeface="Phagspa"/>
+        <a:font script="Syrn" typeface="Estrangelo Edessa"/>
+        <a:font script="Syrj" typeface="Estrangelo Edessa"/>
+        <a:font script="Syre" typeface="Estrangelo Edessa"/>
+        <a:font script="Sora" typeface="Nirmala UI"/>
+        <a:font script="Tale" typeface="Microsoft Tai Le"/>
+        <a:font script="Talu" typeface="Microsoft New Tai Lue"/>
+        <a:font script="Tfng" typeface="Ebrima"/>
+      </a:minorFont>
+    </a:fontScheme>
+    <a:fmtScheme name="Office">
+      <a:fillStyleLst>
+        <a:solidFill>
+          <a:schemeClr val="phClr"/>
+        </a:solidFill>
+        <a:gradFill rotWithShape="1">
+          <a:gsLst>
+            <a:gs pos="0">
+              <a:schemeClr val="phClr">
+                <a:lumMod val="110000"/>
+                <a:satMod val="105000"/>
+                <a:tint val="67000"/>
+              </a:schemeClr>
+            </a:gs>
+            <a:gs pos="50000">
+              <a:schemeClr val="phClr">
+                <a:lumMod val="105000"/>
+                <a:satMod val="103000"/>
+                <a:tint val="73000"/>
+              </a:schemeClr>
+            </a:gs>
+            <a:gs pos="100000">
+              <a:schemeClr val="phClr">
+                <a:lumMod val="105000"/>
+                <a:satMod val="109000"/>
+                <a:tint val="81000"/>
+              </a:schemeClr>
+            </a:gs>
+          </a:gsLst>
+          <a:lin ang="5400000" scaled="0"/>
+        </a:gradFill>
+        <a:gradFill rotWithShape="1">
+          <a:gsLst>
+            <a:gs pos="0">
+              <a:schemeClr val="phClr">
+                <a:satMod val="103000"/>
+                <a:lumMod val="102000"/>
+                <a:tint val="94000"/>
+              </a:schemeClr>
+            </a:gs>
+            <a:gs pos="50000">
+              <a:schemeClr val="phClr">
+                <a:satMod val="110000"/>
+                <a:lumMod val="100000"/>
+                <a:shade val="100000"/>
+              </a:schemeClr>
+            </a:gs>
+            <a:gs pos="100000">
+              <a:schemeClr val="phClr">
+                <a:lumMod val="99000"/>
+                <a:satMod val="120000"/>
+                <a:shade val="78000"/>
+              </a:schemeClr>
+            </a:gs>
+          </a:gsLst>
+          <a:lin ang="5400000" scaled="0"/>
+        </a:gradFill>
+      </a:fillStyleLst>
+      <a:lnStyleLst>
+        <a:ln w="6350" cap="flat" cmpd="sng" algn="ctr">
+          <a:solidFill>
+            <a:schemeClr val="phClr"/>
+          </a:solidFill>
+          <a:prstDash val="solid"/>
+          <a:miter lim="800000"/>
+        </a:ln>
+        <a:ln w="12700" cap="flat" cmpd="sng" algn="ctr">
+          <a:solidFill>
+            <a:schemeClr val="phClr"/>
+          </a:solidFill>
+          <a:prstDash val="solid"/>
+          <a:miter lim="800000"/>
+        </a:ln>
+        <a:ln w="19050" cap="flat" cmpd="sng" algn="ctr">
+          <a:solidFill>
+            <a:schemeClr val="phClr"/>
+          </a:solidFill>
+          <a:prstDash val="solid"/>
+          <a:miter lim="800000"/>
+        </a:ln>
+      </a:lnStyleLst>
+      <a:effectStyleLst>
+        <a:effectStyle>
+          <a:effectLst/>
+        </a:effectStyle>
+        <a:effectStyle>
+          <a:effectLst/>
+        </a:effectStyle>
+        <a:effectStyle>
+          <a:effectLst>
+            <a:outerShdw blurRad="57150" dist="19050" dir="5400000" algn="ctr" rotWithShape="0">
+              <a:srgbClr val="000000">
+                <a:alpha val="63000"/>
+              </a:srgbClr>
+            </a:outerShdw>
+          </a:effectLst>
+        </a:effectStyle>
+      </a:effectStyleLst>
+      <a:bgFillStyleLst>
+        <a:solidFill>
+          <a:schemeClr val="phClr"/>
+        </a:solidFill>
+        <a:solidFill>
+          <a:schemeClr val="phClr">
+            <a:tint val="95000"/>
+            <a:satMod val="170000"/>
+          </a:schemeClr>
+        </a:solidFill>
+        <a:gradFill rotWithShape="1">
+          <a:gsLst>
+            <a:gs pos="0">
+              <a:schemeClr val="phClr">
+                <a:tint val="93000"/>
+                <a:satMod val="150000"/>
+                <a:shade val="98000"/>
+                <a:lumMod val="102000"/>
+              </a:schemeClr>
+            </a:gs>
+            <a:gs pos="50000">
+              <a:schemeClr val="phClr">
+                <a:tint val="98000"/>
+                <a:satMod val="130000"/>
+                <a:shade val="90000"/>
+                <a:lumMod val="103000"/>
+              </a:schemeClr>
+            </a:gs>
+            <a:gs pos="100000">
+              <a:schemeClr val="phClr">
+                <a:shade val="63000"/>
+                <a:satMod val="120000"/>
+              </a:schemeClr>
+            </a:gs>
+          </a:gsLst>
+          <a:lin ang="5400000" scaled="0"/>
+        </a:gradFill>
+      </a:bgFillStyleLst>
+    </a:fmtScheme>
+  </a:themeElements>
+  <a:objectDefaults/>
+  <a:extraClrSchemeLst/>
+  <a:extLst>
+    <a:ext uri="{05A4C25C-085E-4340-85A3-A5531E510DB2}">
+      <thm15:themeFamily xmlns:thm15="http://schemas.microsoft.com/office/thememl/2012/main" name="Office Theme" id="{62F939B6-93AF-4DB8-9C6B-D6C7DFDC589F}" vid="{4A3C46E8-61CC-4603-A589-7422A47A8E4A}"/>
+    </a:ext>
+  </a:extLst>
+</a:theme>
 </file>
</xml_diff>